<commit_message>
base da apresentação concluída (com transições e decorações)
Base do que é necessário para a apresentação das funções do aplicativo concluída
</commit_message>
<xml_diff>
--- a/apresentacao/Guilherme_Samuel_dos_Santos_SP_Apresentacao.pptx
+++ b/apresentacao/Guilherme_Samuel_dos_Santos_SP_Apresentacao.pptx
@@ -8,6 +8,8 @@
     <p:sldId id="256" r:id="rId2"/>
     <p:sldId id="257" r:id="rId3"/>
     <p:sldId id="258" r:id="rId4"/>
+    <p:sldId id="259" r:id="rId5"/>
+    <p:sldId id="260" r:id="rId6"/>
   </p:sldIdLst>
   <p:sldSz cx="12192000" cy="6858000"/>
   <p:notesSz cx="6858000" cy="9144000"/>
@@ -106,6 +108,11 @@
       </a:defRPr>
     </a:lvl9pPr>
   </p:defaultTextStyle>
+  <p:extLst>
+    <p:ext uri="{EFAFB233-063F-42B5-8137-9DF3F51BA10A}">
+      <p15:sldGuideLst xmlns:p15="http://schemas.microsoft.com/office/powerpoint/2012/main"/>
+    </p:ext>
+  </p:extLst>
 </p:presentation>
 </file>
 
@@ -3374,7 +3381,7 @@
         <p:spPr>
           <a:xfrm>
             <a:off x="1044952" y="3244334"/>
-            <a:ext cx="5548795" cy="923330"/>
+            <a:ext cx="5548795" cy="1200329"/>
           </a:xfrm>
           <a:prstGeom prst="rect">
             <a:avLst/>
@@ -3388,7 +3395,7 @@
           <a:lstStyle/>
           <a:p>
             <a:r>
-              <a:rPr lang="pt-BR" dirty="0">
+              <a:rPr lang="pt-BR" sz="2400" dirty="0">
                 <a:latin typeface="Montserrat Alternates ExtraBold" panose="00000900000000000000" pitchFamily="2" charset="0"/>
               </a:rPr>
               <a:t>Nome: Guilherme Santos</a:t>
@@ -3396,7 +3403,7 @@
           </a:p>
           <a:p>
             <a:r>
-              <a:rPr lang="pt-BR" dirty="0">
+              <a:rPr lang="pt-BR" sz="2400" dirty="0">
                 <a:latin typeface="Montserrat Alternates ExtraBold" panose="00000900000000000000" pitchFamily="2" charset="0"/>
               </a:rPr>
               <a:t>DR: São Paulo</a:t>
@@ -3404,7 +3411,7 @@
           </a:p>
           <a:p>
             <a:r>
-              <a:rPr lang="pt-BR" dirty="0">
+              <a:rPr lang="pt-BR" sz="2400" dirty="0">
                 <a:latin typeface="Montserrat Alternates ExtraBold" panose="00000900000000000000" pitchFamily="2" charset="0"/>
               </a:rPr>
               <a:t>Data: 20/10/2022</a:t>
@@ -3452,6 +3459,18 @@
   <p:clrMapOvr>
     <a:masterClrMapping/>
   </p:clrMapOvr>
+  <mc:AlternateContent xmlns:mc="http://schemas.openxmlformats.org/markup-compatibility/2006">
+    <mc:Choice xmlns:p14="http://schemas.microsoft.com/office/powerpoint/2010/main" Requires="p14">
+      <p:transition spd="slow">
+        <p14:flash/>
+      </p:transition>
+    </mc:Choice>
+    <mc:Fallback>
+      <p:transition spd="slow">
+        <p:fade/>
+      </p:transition>
+    </mc:Fallback>
+  </mc:AlternateContent>
 </p:sld>
 </file>
 
@@ -3753,6 +3772,9 @@
   <p:clrMapOvr>
     <a:masterClrMapping/>
   </p:clrMapOvr>
+  <p:transition spd="med">
+    <p:pull/>
+  </p:transition>
 </p:sld>
 </file>
 
@@ -4099,8 +4121,8 @@
         </p:nvSpPr>
         <p:spPr>
           <a:xfrm>
-            <a:off x="1310221" y="1385985"/>
-            <a:ext cx="4162425" cy="2585323"/>
+            <a:off x="1542936" y="5730901"/>
+            <a:ext cx="1439036" cy="369332"/>
           </a:xfrm>
           <a:prstGeom prst="rect">
             <a:avLst/>
@@ -4114,74 +4136,150 @@
           <a:lstStyle/>
           <a:p>
             <a:r>
-              <a:rPr lang="pt-BR" dirty="0">
-                <a:solidFill>
-                  <a:schemeClr val="bg1"/>
-                </a:solidFill>
+              <a:rPr lang="pt-BR" dirty="0" err="1">
                 <a:latin typeface="Montserrat Alternates ExtraBold" panose="00000900000000000000" pitchFamily="2" charset="0"/>
               </a:rPr>
-              <a:t>VitaHealth possui as seguintes funções:</a:t>
-            </a:r>
-          </a:p>
-          <a:p>
-            <a:endParaRPr lang="pt-BR" dirty="0">
-              <a:solidFill>
-                <a:schemeClr val="bg1"/>
-              </a:solidFill>
-              <a:latin typeface="Montserrat Alternates ExtraBold" panose="00000900000000000000" pitchFamily="2" charset="0"/>
-            </a:endParaRPr>
-          </a:p>
-          <a:p>
-            <a:pPr marL="285750" indent="-285750">
-              <a:buFont typeface="Arial" panose="020B0604020202020204" pitchFamily="34" charset="0"/>
-              <a:buChar char="•"/>
-            </a:pPr>
+              <a:t>Exercises</a:t>
+            </a:r>
             <a:r>
               <a:rPr lang="pt-BR" dirty="0">
-                <a:solidFill>
-                  <a:schemeClr val="bg1"/>
-                </a:solidFill>
                 <a:latin typeface="Montserrat Alternates ExtraBold" panose="00000900000000000000" pitchFamily="2" charset="0"/>
               </a:rPr>
-              <a:t>Incentivar todos a terem uma melhor condição de vida;</a:t>
-            </a:r>
-          </a:p>
-          <a:p>
-            <a:pPr marL="285750" indent="-285750">
-              <a:buFont typeface="Arial" panose="020B0604020202020204" pitchFamily="34" charset="0"/>
-              <a:buChar char="•"/>
-            </a:pPr>
-            <a:endParaRPr lang="pt-BR" dirty="0">
-              <a:solidFill>
-                <a:schemeClr val="bg1"/>
-              </a:solidFill>
-              <a:latin typeface="Montserrat Alternates ExtraBold" panose="00000900000000000000" pitchFamily="2" charset="0"/>
-            </a:endParaRPr>
-          </a:p>
-          <a:p>
-            <a:pPr marL="285750" indent="-285750">
-              <a:buFont typeface="Arial" panose="020B0604020202020204" pitchFamily="34" charset="0"/>
-              <a:buChar char="•"/>
-            </a:pPr>
+              <a:t>!</a:t>
+            </a:r>
+          </a:p>
+        </p:txBody>
+      </p:sp>
+      <p:sp>
+        <p:nvSpPr>
+          <p:cNvPr id="10" name="CaixaDeTexto 9">
+            <a:extLst>
+              <a:ext uri="{FF2B5EF4-FFF2-40B4-BE49-F238E27FC236}">
+                <a16:creationId xmlns:a16="http://schemas.microsoft.com/office/drawing/2014/main" id="{C100A73C-C522-4BFD-88E0-D56AF434EAAF}"/>
+              </a:ext>
+            </a:extLst>
+          </p:cNvPr>
+          <p:cNvSpPr txBox="1"/>
+          <p:nvPr/>
+        </p:nvSpPr>
+        <p:spPr>
+          <a:xfrm>
+            <a:off x="4196151" y="5767987"/>
+            <a:ext cx="1439036" cy="369332"/>
+          </a:xfrm>
+          <a:prstGeom prst="rect">
+            <a:avLst/>
+          </a:prstGeom>
+          <a:noFill/>
+        </p:spPr>
+        <p:txBody>
+          <a:bodyPr wrap="square" rtlCol="0">
+            <a:spAutoFit/>
+          </a:bodyPr>
+          <a:lstStyle/>
+          <a:p>
+            <a:pPr algn="ctr"/>
             <a:r>
               <a:rPr lang="pt-BR" dirty="0">
-                <a:solidFill>
-                  <a:schemeClr val="bg1"/>
-                </a:solidFill>
                 <a:latin typeface="Montserrat Alternates ExtraBold" panose="00000900000000000000" pitchFamily="2" charset="0"/>
               </a:rPr>
-              <a:t>Estimular exercícios diários em todos os seus usuários.</a:t>
-            </a:r>
-          </a:p>
-          <a:p>
-            <a:pPr marL="285750" indent="-285750">
-              <a:buFont typeface="Arial" panose="020B0604020202020204" pitchFamily="34" charset="0"/>
-              <a:buChar char="•"/>
-            </a:pPr>
-            <a:endParaRPr lang="pt-BR" dirty="0"/>
-          </a:p>
-        </p:txBody>
-      </p:sp>
+              <a:t>Shop!</a:t>
+            </a:r>
+          </a:p>
+        </p:txBody>
+      </p:sp>
+      <p:sp>
+        <p:nvSpPr>
+          <p:cNvPr id="11" name="CaixaDeTexto 10">
+            <a:extLst>
+              <a:ext uri="{FF2B5EF4-FFF2-40B4-BE49-F238E27FC236}">
+                <a16:creationId xmlns:a16="http://schemas.microsoft.com/office/drawing/2014/main" id="{A01DF57F-72C5-4C6C-9CB4-EE0C3DAC81C0}"/>
+              </a:ext>
+            </a:extLst>
+          </p:cNvPr>
+          <p:cNvSpPr txBox="1"/>
+          <p:nvPr/>
+        </p:nvSpPr>
+        <p:spPr>
+          <a:xfrm>
+            <a:off x="7162800" y="5730901"/>
+            <a:ext cx="1439036" cy="646331"/>
+          </a:xfrm>
+          <a:prstGeom prst="rect">
+            <a:avLst/>
+          </a:prstGeom>
+          <a:noFill/>
+        </p:spPr>
+        <p:txBody>
+          <a:bodyPr wrap="square" rtlCol="0">
+            <a:spAutoFit/>
+          </a:bodyPr>
+          <a:lstStyle/>
+          <a:p>
+            <a:pPr algn="ctr"/>
+            <a:r>
+              <a:rPr lang="pt-BR" dirty="0" err="1">
+                <a:latin typeface="Montserrat Alternates ExtraBold" panose="00000900000000000000" pitchFamily="2" charset="0"/>
+              </a:rPr>
+              <a:t>Know</a:t>
+            </a:r>
+            <a:r>
+              <a:rPr lang="pt-BR" dirty="0">
+                <a:latin typeface="Montserrat Alternates ExtraBold" panose="00000900000000000000" pitchFamily="2" charset="0"/>
+              </a:rPr>
+              <a:t> </a:t>
+            </a:r>
+            <a:r>
+              <a:rPr lang="pt-BR" dirty="0" err="1">
+                <a:latin typeface="Montserrat Alternates ExtraBold" panose="00000900000000000000" pitchFamily="2" charset="0"/>
+              </a:rPr>
+              <a:t>yourself</a:t>
+            </a:r>
+            <a:r>
+              <a:rPr lang="pt-BR" dirty="0">
+                <a:latin typeface="Montserrat Alternates ExtraBold" panose="00000900000000000000" pitchFamily="2" charset="0"/>
+              </a:rPr>
+              <a:t>!</a:t>
+            </a:r>
+          </a:p>
+        </p:txBody>
+      </p:sp>
+      <p:pic>
+        <p:nvPicPr>
+          <p:cNvPr id="13" name="Imagem 12">
+            <a:extLst>
+              <a:ext uri="{FF2B5EF4-FFF2-40B4-BE49-F238E27FC236}">
+                <a16:creationId xmlns:a16="http://schemas.microsoft.com/office/drawing/2014/main" id="{C6BEA2B6-8EA3-460B-B331-BB2BF1EA2033}"/>
+              </a:ext>
+            </a:extLst>
+          </p:cNvPr>
+          <p:cNvPicPr>
+            <a:picLocks noChangeAspect="1"/>
+          </p:cNvPicPr>
+          <p:nvPr/>
+        </p:nvPicPr>
+        <p:blipFill>
+          <a:blip r:embed="rId6">
+            <a:extLst>
+              <a:ext uri="{28A0092B-C50C-407E-A947-70E740481C1C}">
+                <a14:useLocalDpi xmlns:a14="http://schemas.microsoft.com/office/drawing/2010/main" val="0"/>
+              </a:ext>
+            </a:extLst>
+          </a:blip>
+          <a:stretch>
+            <a:fillRect/>
+          </a:stretch>
+        </p:blipFill>
+        <p:spPr>
+          <a:xfrm>
+            <a:off x="574407" y="340325"/>
+            <a:ext cx="2453257" cy="1009720"/>
+          </a:xfrm>
+          <a:prstGeom prst="rect">
+            <a:avLst/>
+          </a:prstGeom>
+        </p:spPr>
+      </p:pic>
     </p:spTree>
     <p:extLst>
       <p:ext uri="{BB962C8B-B14F-4D97-AF65-F5344CB8AC3E}">
@@ -4192,6 +4290,1041 @@
   <p:clrMapOvr>
     <a:masterClrMapping/>
   </p:clrMapOvr>
+  <p:transition spd="slow">
+    <p:cover/>
+  </p:transition>
+</p:sld>
+</file>
+
+<file path=ppt/slides/slide4.xml><?xml version="1.0" encoding="utf-8"?>
+<p:sld xmlns:a="http://schemas.openxmlformats.org/drawingml/2006/main" xmlns:r="http://schemas.openxmlformats.org/officeDocument/2006/relationships" xmlns:p="http://schemas.openxmlformats.org/presentationml/2006/main">
+  <p:cSld>
+    <p:spTree>
+      <p:nvGrpSpPr>
+        <p:cNvPr id="1" name=""/>
+        <p:cNvGrpSpPr/>
+        <p:nvPr/>
+      </p:nvGrpSpPr>
+      <p:grpSpPr>
+        <a:xfrm>
+          <a:off x="0" y="0"/>
+          <a:ext cx="0" cy="0"/>
+          <a:chOff x="0" y="0"/>
+          <a:chExt cx="0" cy="0"/>
+        </a:xfrm>
+      </p:grpSpPr>
+      <p:sp>
+        <p:nvSpPr>
+          <p:cNvPr id="4" name="Retângulo 3">
+            <a:extLst>
+              <a:ext uri="{FF2B5EF4-FFF2-40B4-BE49-F238E27FC236}">
+                <a16:creationId xmlns:a16="http://schemas.microsoft.com/office/drawing/2014/main" id="{853E865E-546C-4B53-A92E-E1CB442BF142}"/>
+              </a:ext>
+            </a:extLst>
+          </p:cNvPr>
+          <p:cNvSpPr/>
+          <p:nvPr/>
+        </p:nvSpPr>
+        <p:spPr>
+          <a:xfrm>
+            <a:off x="0" y="0"/>
+            <a:ext cx="12192000" cy="6858000"/>
+          </a:xfrm>
+          <a:prstGeom prst="rect">
+            <a:avLst/>
+          </a:prstGeom>
+          <a:solidFill>
+            <a:srgbClr val="3A3A3C"/>
+          </a:solidFill>
+          <a:ln>
+            <a:noFill/>
+          </a:ln>
+        </p:spPr>
+        <p:style>
+          <a:lnRef idx="2">
+            <a:schemeClr val="accent1">
+              <a:shade val="50000"/>
+            </a:schemeClr>
+          </a:lnRef>
+          <a:fillRef idx="1">
+            <a:schemeClr val="accent1"/>
+          </a:fillRef>
+          <a:effectRef idx="0">
+            <a:schemeClr val="accent1"/>
+          </a:effectRef>
+          <a:fontRef idx="minor">
+            <a:schemeClr val="lt1"/>
+          </a:fontRef>
+        </p:style>
+        <p:txBody>
+          <a:bodyPr rtlCol="0" anchor="ctr"/>
+          <a:lstStyle/>
+          <a:p>
+            <a:pPr algn="ctr"/>
+            <a:endParaRPr lang="pt-BR"/>
+          </a:p>
+        </p:txBody>
+      </p:sp>
+      <p:sp>
+        <p:nvSpPr>
+          <p:cNvPr id="6" name="CaixaDeTexto 5">
+            <a:extLst>
+              <a:ext uri="{FF2B5EF4-FFF2-40B4-BE49-F238E27FC236}">
+                <a16:creationId xmlns:a16="http://schemas.microsoft.com/office/drawing/2014/main" id="{E7F00FCA-2339-4457-837D-3F0B366728C3}"/>
+              </a:ext>
+            </a:extLst>
+          </p:cNvPr>
+          <p:cNvSpPr txBox="1"/>
+          <p:nvPr/>
+        </p:nvSpPr>
+        <p:spPr>
+          <a:xfrm>
+            <a:off x="3905165" y="2271213"/>
+            <a:ext cx="4411588" cy="369332"/>
+          </a:xfrm>
+          <a:prstGeom prst="rect">
+            <a:avLst/>
+          </a:prstGeom>
+          <a:noFill/>
+        </p:spPr>
+        <p:txBody>
+          <a:bodyPr wrap="square" rtlCol="0">
+            <a:spAutoFit/>
+          </a:bodyPr>
+          <a:lstStyle/>
+          <a:p>
+            <a:r>
+              <a:rPr lang="pt-BR" dirty="0">
+                <a:solidFill>
+                  <a:schemeClr val="bg1"/>
+                </a:solidFill>
+                <a:latin typeface="Montserrat Alternates ExtraBold" panose="00000900000000000000" pitchFamily="2" charset="0"/>
+              </a:rPr>
+              <a:t>Requisitos para rodar o aplicativo</a:t>
+            </a:r>
+          </a:p>
+        </p:txBody>
+      </p:sp>
+      <p:pic>
+        <p:nvPicPr>
+          <p:cNvPr id="3" name="Imagem 2">
+            <a:extLst>
+              <a:ext uri="{FF2B5EF4-FFF2-40B4-BE49-F238E27FC236}">
+                <a16:creationId xmlns:a16="http://schemas.microsoft.com/office/drawing/2014/main" id="{61CFC1CB-6889-4097-B9F4-6BF5927268F1}"/>
+              </a:ext>
+            </a:extLst>
+          </p:cNvPr>
+          <p:cNvPicPr>
+            <a:picLocks noChangeAspect="1"/>
+          </p:cNvPicPr>
+          <p:nvPr/>
+        </p:nvPicPr>
+        <p:blipFill>
+          <a:blip r:embed="rId2">
+            <a:extLst>
+              <a:ext uri="{28A0092B-C50C-407E-A947-70E740481C1C}">
+                <a14:useLocalDpi xmlns:a14="http://schemas.microsoft.com/office/drawing/2010/main" val="0"/>
+              </a:ext>
+            </a:extLst>
+          </a:blip>
+          <a:stretch>
+            <a:fillRect/>
+          </a:stretch>
+        </p:blipFill>
+        <p:spPr>
+          <a:xfrm>
+            <a:off x="4253768" y="324354"/>
+            <a:ext cx="3684464" cy="1622505"/>
+          </a:xfrm>
+          <a:prstGeom prst="rect">
+            <a:avLst/>
+          </a:prstGeom>
+        </p:spPr>
+      </p:pic>
+      <p:sp>
+        <p:nvSpPr>
+          <p:cNvPr id="8" name="Retângulo 7">
+            <a:extLst>
+              <a:ext uri="{FF2B5EF4-FFF2-40B4-BE49-F238E27FC236}">
+                <a16:creationId xmlns:a16="http://schemas.microsoft.com/office/drawing/2014/main" id="{E28103B2-CB44-4678-B1C2-AE5D46F99800}"/>
+              </a:ext>
+            </a:extLst>
+          </p:cNvPr>
+          <p:cNvSpPr/>
+          <p:nvPr/>
+        </p:nvSpPr>
+        <p:spPr>
+          <a:xfrm>
+            <a:off x="6065240" y="2818701"/>
+            <a:ext cx="45719" cy="3884103"/>
+          </a:xfrm>
+          <a:prstGeom prst="rect">
+            <a:avLst/>
+          </a:prstGeom>
+          <a:solidFill>
+            <a:schemeClr val="bg1"/>
+          </a:solidFill>
+          <a:ln>
+            <a:noFill/>
+          </a:ln>
+        </p:spPr>
+        <p:style>
+          <a:lnRef idx="2">
+            <a:schemeClr val="accent1">
+              <a:shade val="50000"/>
+            </a:schemeClr>
+          </a:lnRef>
+          <a:fillRef idx="1">
+            <a:schemeClr val="accent1"/>
+          </a:fillRef>
+          <a:effectRef idx="0">
+            <a:schemeClr val="accent1"/>
+          </a:effectRef>
+          <a:fontRef idx="minor">
+            <a:schemeClr val="lt1"/>
+          </a:fontRef>
+        </p:style>
+        <p:txBody>
+          <a:bodyPr rtlCol="0" anchor="ctr"/>
+          <a:lstStyle/>
+          <a:p>
+            <a:pPr algn="ctr"/>
+            <a:endParaRPr lang="pt-BR"/>
+          </a:p>
+        </p:txBody>
+      </p:sp>
+      <p:pic>
+        <p:nvPicPr>
+          <p:cNvPr id="9" name="Imagem 8">
+            <a:extLst>
+              <a:ext uri="{FF2B5EF4-FFF2-40B4-BE49-F238E27FC236}">
+                <a16:creationId xmlns:a16="http://schemas.microsoft.com/office/drawing/2014/main" id="{7A60566A-7DDE-4BAE-BF7F-D0CA60A672C4}"/>
+              </a:ext>
+            </a:extLst>
+          </p:cNvPr>
+          <p:cNvPicPr>
+            <a:picLocks noChangeAspect="1"/>
+          </p:cNvPicPr>
+          <p:nvPr/>
+        </p:nvPicPr>
+        <p:blipFill>
+          <a:blip r:embed="rId3"/>
+          <a:stretch>
+            <a:fillRect/>
+          </a:stretch>
+        </p:blipFill>
+        <p:spPr>
+          <a:xfrm>
+            <a:off x="220026" y="3341034"/>
+            <a:ext cx="5353797" cy="1752845"/>
+          </a:xfrm>
+          <a:prstGeom prst="rect">
+            <a:avLst/>
+          </a:prstGeom>
+        </p:spPr>
+      </p:pic>
+      <p:pic>
+        <p:nvPicPr>
+          <p:cNvPr id="10" name="Imagem 9">
+            <a:extLst>
+              <a:ext uri="{FF2B5EF4-FFF2-40B4-BE49-F238E27FC236}">
+                <a16:creationId xmlns:a16="http://schemas.microsoft.com/office/drawing/2014/main" id="{D5FB049D-90F1-463A-B9AB-16B97222B41E}"/>
+              </a:ext>
+            </a:extLst>
+          </p:cNvPr>
+          <p:cNvPicPr>
+            <a:picLocks noChangeAspect="1"/>
+          </p:cNvPicPr>
+          <p:nvPr/>
+        </p:nvPicPr>
+        <p:blipFill>
+          <a:blip r:embed="rId4"/>
+          <a:stretch>
+            <a:fillRect/>
+          </a:stretch>
+        </p:blipFill>
+        <p:spPr>
+          <a:xfrm>
+            <a:off x="7093792" y="3596586"/>
+            <a:ext cx="4115374" cy="1152686"/>
+          </a:xfrm>
+          <a:prstGeom prst="rect">
+            <a:avLst/>
+          </a:prstGeom>
+        </p:spPr>
+      </p:pic>
+      <p:pic>
+        <p:nvPicPr>
+          <p:cNvPr id="12" name="Imagem 11">
+            <a:extLst>
+              <a:ext uri="{FF2B5EF4-FFF2-40B4-BE49-F238E27FC236}">
+                <a16:creationId xmlns:a16="http://schemas.microsoft.com/office/drawing/2014/main" id="{CD017CD3-58CE-4DE2-A6E3-7E3C3C637509}"/>
+              </a:ext>
+            </a:extLst>
+          </p:cNvPr>
+          <p:cNvPicPr>
+            <a:picLocks noChangeAspect="1"/>
+          </p:cNvPicPr>
+          <p:nvPr/>
+        </p:nvPicPr>
+        <p:blipFill>
+          <a:blip r:embed="rId5">
+            <a:extLst>
+              <a:ext uri="{28A0092B-C50C-407E-A947-70E740481C1C}">
+                <a14:useLocalDpi xmlns:a14="http://schemas.microsoft.com/office/drawing/2010/main" val="0"/>
+              </a:ext>
+            </a:extLst>
+          </a:blip>
+          <a:stretch>
+            <a:fillRect/>
+          </a:stretch>
+        </p:blipFill>
+        <p:spPr>
+          <a:xfrm>
+            <a:off x="5388398" y="4908454"/>
+            <a:ext cx="370850" cy="370850"/>
+          </a:xfrm>
+          <a:prstGeom prst="rect">
+            <a:avLst/>
+          </a:prstGeom>
+        </p:spPr>
+      </p:pic>
+      <p:pic>
+        <p:nvPicPr>
+          <p:cNvPr id="13" name="Imagem 12">
+            <a:extLst>
+              <a:ext uri="{FF2B5EF4-FFF2-40B4-BE49-F238E27FC236}">
+                <a16:creationId xmlns:a16="http://schemas.microsoft.com/office/drawing/2014/main" id="{2F6E7C70-48BB-445C-B613-69486461D6F4}"/>
+              </a:ext>
+            </a:extLst>
+          </p:cNvPr>
+          <p:cNvPicPr>
+            <a:picLocks noChangeAspect="1"/>
+          </p:cNvPicPr>
+          <p:nvPr/>
+        </p:nvPicPr>
+        <p:blipFill>
+          <a:blip r:embed="rId5">
+            <a:extLst>
+              <a:ext uri="{28A0092B-C50C-407E-A947-70E740481C1C}">
+                <a14:useLocalDpi xmlns:a14="http://schemas.microsoft.com/office/drawing/2010/main" val="0"/>
+              </a:ext>
+            </a:extLst>
+          </a:blip>
+          <a:stretch>
+            <a:fillRect/>
+          </a:stretch>
+        </p:blipFill>
+        <p:spPr>
+          <a:xfrm>
+            <a:off x="34601" y="4908454"/>
+            <a:ext cx="370850" cy="370850"/>
+          </a:xfrm>
+          <a:prstGeom prst="rect">
+            <a:avLst/>
+          </a:prstGeom>
+        </p:spPr>
+      </p:pic>
+      <p:pic>
+        <p:nvPicPr>
+          <p:cNvPr id="14" name="Imagem 13">
+            <a:extLst>
+              <a:ext uri="{FF2B5EF4-FFF2-40B4-BE49-F238E27FC236}">
+                <a16:creationId xmlns:a16="http://schemas.microsoft.com/office/drawing/2014/main" id="{DCB32E2A-317C-43E0-AD6F-96E284A9C307}"/>
+              </a:ext>
+            </a:extLst>
+          </p:cNvPr>
+          <p:cNvPicPr>
+            <a:picLocks noChangeAspect="1"/>
+          </p:cNvPicPr>
+          <p:nvPr/>
+        </p:nvPicPr>
+        <p:blipFill>
+          <a:blip r:embed="rId5">
+            <a:extLst>
+              <a:ext uri="{28A0092B-C50C-407E-A947-70E740481C1C}">
+                <a14:useLocalDpi xmlns:a14="http://schemas.microsoft.com/office/drawing/2010/main" val="0"/>
+              </a:ext>
+            </a:extLst>
+          </a:blip>
+          <a:stretch>
+            <a:fillRect/>
+          </a:stretch>
+        </p:blipFill>
+        <p:spPr>
+          <a:xfrm>
+            <a:off x="6908367" y="3429000"/>
+            <a:ext cx="370850" cy="370850"/>
+          </a:xfrm>
+          <a:prstGeom prst="rect">
+            <a:avLst/>
+          </a:prstGeom>
+        </p:spPr>
+      </p:pic>
+      <p:pic>
+        <p:nvPicPr>
+          <p:cNvPr id="15" name="Imagem 14">
+            <a:extLst>
+              <a:ext uri="{FF2B5EF4-FFF2-40B4-BE49-F238E27FC236}">
+                <a16:creationId xmlns:a16="http://schemas.microsoft.com/office/drawing/2014/main" id="{50559897-409F-40BD-A683-74624E37AB11}"/>
+              </a:ext>
+            </a:extLst>
+          </p:cNvPr>
+          <p:cNvPicPr>
+            <a:picLocks noChangeAspect="1"/>
+          </p:cNvPicPr>
+          <p:nvPr/>
+        </p:nvPicPr>
+        <p:blipFill>
+          <a:blip r:embed="rId5">
+            <a:extLst>
+              <a:ext uri="{28A0092B-C50C-407E-A947-70E740481C1C}">
+                <a14:useLocalDpi xmlns:a14="http://schemas.microsoft.com/office/drawing/2010/main" val="0"/>
+              </a:ext>
+            </a:extLst>
+          </a:blip>
+          <a:stretch>
+            <a:fillRect/>
+          </a:stretch>
+        </p:blipFill>
+        <p:spPr>
+          <a:xfrm>
+            <a:off x="11048187" y="4575327"/>
+            <a:ext cx="370850" cy="370850"/>
+          </a:xfrm>
+          <a:prstGeom prst="rect">
+            <a:avLst/>
+          </a:prstGeom>
+        </p:spPr>
+      </p:pic>
+    </p:spTree>
+    <p:extLst>
+      <p:ext uri="{BB962C8B-B14F-4D97-AF65-F5344CB8AC3E}">
+        <p14:creationId xmlns:p14="http://schemas.microsoft.com/office/powerpoint/2010/main" val="3200323309"/>
+      </p:ext>
+    </p:extLst>
+  </p:cSld>
+  <p:clrMapOvr>
+    <a:masterClrMapping/>
+  </p:clrMapOvr>
+  <mc:AlternateContent xmlns:mc="http://schemas.openxmlformats.org/markup-compatibility/2006">
+    <mc:Choice xmlns:p14="http://schemas.microsoft.com/office/powerpoint/2010/main" Requires="p14">
+      <p:transition spd="slow" p14:dur="1200">
+        <p:dissolve/>
+      </p:transition>
+    </mc:Choice>
+    <mc:Fallback>
+      <p:transition spd="slow">
+        <p:dissolve/>
+      </p:transition>
+    </mc:Fallback>
+  </mc:AlternateContent>
+</p:sld>
+</file>
+
+<file path=ppt/slides/slide5.xml><?xml version="1.0" encoding="utf-8"?>
+<p:sld xmlns:a="http://schemas.openxmlformats.org/drawingml/2006/main" xmlns:r="http://schemas.openxmlformats.org/officeDocument/2006/relationships" xmlns:p="http://schemas.openxmlformats.org/presentationml/2006/main">
+  <p:cSld>
+    <p:spTree>
+      <p:nvGrpSpPr>
+        <p:cNvPr id="1" name=""/>
+        <p:cNvGrpSpPr/>
+        <p:nvPr/>
+      </p:nvGrpSpPr>
+      <p:grpSpPr>
+        <a:xfrm>
+          <a:off x="0" y="0"/>
+          <a:ext cx="0" cy="0"/>
+          <a:chOff x="0" y="0"/>
+          <a:chExt cx="0" cy="0"/>
+        </a:xfrm>
+      </p:grpSpPr>
+      <p:sp>
+        <p:nvSpPr>
+          <p:cNvPr id="6" name="CaixaDeTexto 5">
+            <a:extLst>
+              <a:ext uri="{FF2B5EF4-FFF2-40B4-BE49-F238E27FC236}">
+                <a16:creationId xmlns:a16="http://schemas.microsoft.com/office/drawing/2014/main" id="{E7F00FCA-2339-4457-837D-3F0B366728C3}"/>
+              </a:ext>
+            </a:extLst>
+          </p:cNvPr>
+          <p:cNvSpPr txBox="1"/>
+          <p:nvPr/>
+        </p:nvSpPr>
+        <p:spPr>
+          <a:xfrm>
+            <a:off x="390526" y="434071"/>
+            <a:ext cx="3088469" cy="646331"/>
+          </a:xfrm>
+          <a:prstGeom prst="rect">
+            <a:avLst/>
+          </a:prstGeom>
+          <a:noFill/>
+        </p:spPr>
+        <p:txBody>
+          <a:bodyPr wrap="square" rtlCol="0">
+            <a:spAutoFit/>
+          </a:bodyPr>
+          <a:lstStyle/>
+          <a:p>
+            <a:r>
+              <a:rPr lang="pt-BR" sz="3600" dirty="0">
+                <a:solidFill>
+                  <a:schemeClr val="bg1"/>
+                </a:solidFill>
+                <a:latin typeface="Montserrat Alternates ExtraBold" panose="00000900000000000000" pitchFamily="2" charset="0"/>
+              </a:rPr>
+              <a:t>Introdução</a:t>
+            </a:r>
+          </a:p>
+        </p:txBody>
+      </p:sp>
+      <p:pic>
+        <p:nvPicPr>
+          <p:cNvPr id="7" name="Imagem 6">
+            <a:extLst>
+              <a:ext uri="{FF2B5EF4-FFF2-40B4-BE49-F238E27FC236}">
+                <a16:creationId xmlns:a16="http://schemas.microsoft.com/office/drawing/2014/main" id="{29F6B48A-A2EF-4587-9F1A-E2B0D8CD8161}"/>
+              </a:ext>
+            </a:extLst>
+          </p:cNvPr>
+          <p:cNvPicPr>
+            <a:picLocks noChangeAspect="1"/>
+          </p:cNvPicPr>
+          <p:nvPr/>
+        </p:nvPicPr>
+        <p:blipFill>
+          <a:blip r:embed="rId2"/>
+          <a:stretch>
+            <a:fillRect/>
+          </a:stretch>
+        </p:blipFill>
+        <p:spPr>
+          <a:xfrm flipH="1">
+            <a:off x="0" y="0"/>
+            <a:ext cx="2340207" cy="6858000"/>
+          </a:xfrm>
+          <a:prstGeom prst="rect">
+            <a:avLst/>
+          </a:prstGeom>
+        </p:spPr>
+      </p:pic>
+      <p:pic>
+        <p:nvPicPr>
+          <p:cNvPr id="9" name="Imagem 8">
+            <a:extLst>
+              <a:ext uri="{FF2B5EF4-FFF2-40B4-BE49-F238E27FC236}">
+                <a16:creationId xmlns:a16="http://schemas.microsoft.com/office/drawing/2014/main" id="{3667407E-248F-47FC-B597-411DD37DAA2B}"/>
+              </a:ext>
+            </a:extLst>
+          </p:cNvPr>
+          <p:cNvPicPr>
+            <a:picLocks noChangeAspect="1"/>
+          </p:cNvPicPr>
+          <p:nvPr/>
+        </p:nvPicPr>
+        <p:blipFill>
+          <a:blip r:embed="rId3">
+            <a:extLst>
+              <a:ext uri="{28A0092B-C50C-407E-A947-70E740481C1C}">
+                <a14:useLocalDpi xmlns:a14="http://schemas.microsoft.com/office/drawing/2010/main" val="0"/>
+              </a:ext>
+            </a:extLst>
+          </a:blip>
+          <a:stretch>
+            <a:fillRect/>
+          </a:stretch>
+        </p:blipFill>
+        <p:spPr>
+          <a:xfrm>
+            <a:off x="4098546" y="1074394"/>
+            <a:ext cx="4513281" cy="1857591"/>
+          </a:xfrm>
+          <a:prstGeom prst="rect">
+            <a:avLst/>
+          </a:prstGeom>
+        </p:spPr>
+      </p:pic>
+      <p:sp>
+        <p:nvSpPr>
+          <p:cNvPr id="10" name="CaixaDeTexto 9">
+            <a:extLst>
+              <a:ext uri="{FF2B5EF4-FFF2-40B4-BE49-F238E27FC236}">
+                <a16:creationId xmlns:a16="http://schemas.microsoft.com/office/drawing/2014/main" id="{38E6C1CB-0B17-4534-8DB1-DC21AB5E7548}"/>
+              </a:ext>
+            </a:extLst>
+          </p:cNvPr>
+          <p:cNvSpPr txBox="1"/>
+          <p:nvPr/>
+        </p:nvSpPr>
+        <p:spPr>
+          <a:xfrm>
+            <a:off x="3084191" y="3559151"/>
+            <a:ext cx="6023617" cy="1323439"/>
+          </a:xfrm>
+          <a:prstGeom prst="rect">
+            <a:avLst/>
+          </a:prstGeom>
+          <a:noFill/>
+        </p:spPr>
+        <p:txBody>
+          <a:bodyPr wrap="square" rtlCol="0">
+            <a:spAutoFit/>
+          </a:bodyPr>
+          <a:lstStyle/>
+          <a:p>
+            <a:pPr algn="ctr"/>
+            <a:r>
+              <a:rPr lang="pt-BR" sz="4000" dirty="0">
+                <a:latin typeface="Montserrat Alternates ExtraBold" panose="00000900000000000000" pitchFamily="2" charset="0"/>
+              </a:rPr>
+              <a:t>Muito obrigado pela sua atenção!</a:t>
+            </a:r>
+          </a:p>
+        </p:txBody>
+      </p:sp>
+      <p:pic>
+        <p:nvPicPr>
+          <p:cNvPr id="11" name="Imagem 10">
+            <a:extLst>
+              <a:ext uri="{FF2B5EF4-FFF2-40B4-BE49-F238E27FC236}">
+                <a16:creationId xmlns:a16="http://schemas.microsoft.com/office/drawing/2014/main" id="{E8980FE7-8DC6-4787-938B-0F5122184049}"/>
+              </a:ext>
+            </a:extLst>
+          </p:cNvPr>
+          <p:cNvPicPr>
+            <a:picLocks noChangeAspect="1"/>
+          </p:cNvPicPr>
+          <p:nvPr/>
+        </p:nvPicPr>
+        <p:blipFill>
+          <a:blip r:embed="rId2"/>
+          <a:stretch>
+            <a:fillRect/>
+          </a:stretch>
+        </p:blipFill>
+        <p:spPr>
+          <a:xfrm>
+            <a:off x="9663796" y="0"/>
+            <a:ext cx="2528204" cy="6858000"/>
+          </a:xfrm>
+          <a:prstGeom prst="rect">
+            <a:avLst/>
+          </a:prstGeom>
+        </p:spPr>
+      </p:pic>
+      <p:pic>
+        <p:nvPicPr>
+          <p:cNvPr id="5" name="Imagem 4">
+            <a:extLst>
+              <a:ext uri="{FF2B5EF4-FFF2-40B4-BE49-F238E27FC236}">
+                <a16:creationId xmlns:a16="http://schemas.microsoft.com/office/drawing/2014/main" id="{A9ABF909-40A8-4739-8135-FECA555FE8B3}"/>
+              </a:ext>
+            </a:extLst>
+          </p:cNvPr>
+          <p:cNvPicPr>
+            <a:picLocks noChangeAspect="1"/>
+          </p:cNvPicPr>
+          <p:nvPr/>
+        </p:nvPicPr>
+        <p:blipFill>
+          <a:blip r:embed="rId4"/>
+          <a:stretch>
+            <a:fillRect/>
+          </a:stretch>
+        </p:blipFill>
+        <p:spPr>
+          <a:xfrm>
+            <a:off x="2624927" y="5656156"/>
+            <a:ext cx="767249" cy="696967"/>
+          </a:xfrm>
+          <a:prstGeom prst="rect">
+            <a:avLst/>
+          </a:prstGeom>
+        </p:spPr>
+      </p:pic>
+      <p:pic>
+        <p:nvPicPr>
+          <p:cNvPr id="13" name="Imagem 12">
+            <a:extLst>
+              <a:ext uri="{FF2B5EF4-FFF2-40B4-BE49-F238E27FC236}">
+                <a16:creationId xmlns:a16="http://schemas.microsoft.com/office/drawing/2014/main" id="{2C047AA7-B2C2-49E3-824B-C6009771D536}"/>
+              </a:ext>
+            </a:extLst>
+          </p:cNvPr>
+          <p:cNvPicPr>
+            <a:picLocks noChangeAspect="1"/>
+          </p:cNvPicPr>
+          <p:nvPr/>
+        </p:nvPicPr>
+        <p:blipFill>
+          <a:blip r:embed="rId4"/>
+          <a:stretch>
+            <a:fillRect/>
+          </a:stretch>
+        </p:blipFill>
+        <p:spPr>
+          <a:xfrm>
+            <a:off x="9366990" y="408752"/>
+            <a:ext cx="767249" cy="696967"/>
+          </a:xfrm>
+          <a:prstGeom prst="rect">
+            <a:avLst/>
+          </a:prstGeom>
+        </p:spPr>
+      </p:pic>
+      <p:pic>
+        <p:nvPicPr>
+          <p:cNvPr id="14" name="Imagem 13">
+            <a:extLst>
+              <a:ext uri="{FF2B5EF4-FFF2-40B4-BE49-F238E27FC236}">
+                <a16:creationId xmlns:a16="http://schemas.microsoft.com/office/drawing/2014/main" id="{626A1648-BEF5-43B6-8637-FE09B7A5B6E7}"/>
+              </a:ext>
+            </a:extLst>
+          </p:cNvPr>
+          <p:cNvPicPr>
+            <a:picLocks noChangeAspect="1"/>
+          </p:cNvPicPr>
+          <p:nvPr/>
+        </p:nvPicPr>
+        <p:blipFill>
+          <a:blip r:embed="rId4"/>
+          <a:stretch>
+            <a:fillRect/>
+          </a:stretch>
+        </p:blipFill>
+        <p:spPr>
+          <a:xfrm>
+            <a:off x="8896547" y="5307672"/>
+            <a:ext cx="767249" cy="696967"/>
+          </a:xfrm>
+          <a:prstGeom prst="rect">
+            <a:avLst/>
+          </a:prstGeom>
+        </p:spPr>
+      </p:pic>
+      <p:pic>
+        <p:nvPicPr>
+          <p:cNvPr id="15" name="Imagem 14">
+            <a:extLst>
+              <a:ext uri="{FF2B5EF4-FFF2-40B4-BE49-F238E27FC236}">
+                <a16:creationId xmlns:a16="http://schemas.microsoft.com/office/drawing/2014/main" id="{A7CDBADF-C66E-4B9E-82F5-135F83E5E81D}"/>
+              </a:ext>
+            </a:extLst>
+          </p:cNvPr>
+          <p:cNvPicPr>
+            <a:picLocks noChangeAspect="1"/>
+          </p:cNvPicPr>
+          <p:nvPr/>
+        </p:nvPicPr>
+        <p:blipFill>
+          <a:blip r:embed="rId4"/>
+          <a:stretch>
+            <a:fillRect/>
+          </a:stretch>
+        </p:blipFill>
+        <p:spPr>
+          <a:xfrm>
+            <a:off x="1478818" y="158230"/>
+            <a:ext cx="767249" cy="696967"/>
+          </a:xfrm>
+          <a:prstGeom prst="rect">
+            <a:avLst/>
+          </a:prstGeom>
+        </p:spPr>
+      </p:pic>
+      <p:pic>
+        <p:nvPicPr>
+          <p:cNvPr id="16" name="Imagem 15">
+            <a:extLst>
+              <a:ext uri="{FF2B5EF4-FFF2-40B4-BE49-F238E27FC236}">
+                <a16:creationId xmlns:a16="http://schemas.microsoft.com/office/drawing/2014/main" id="{9EFE7944-DCFB-44B6-A3F1-23B66FE2809F}"/>
+              </a:ext>
+            </a:extLst>
+          </p:cNvPr>
+          <p:cNvPicPr>
+            <a:picLocks noChangeAspect="1"/>
+          </p:cNvPicPr>
+          <p:nvPr/>
+        </p:nvPicPr>
+        <p:blipFill>
+          <a:blip r:embed="rId5"/>
+          <a:stretch>
+            <a:fillRect/>
+          </a:stretch>
+        </p:blipFill>
+        <p:spPr>
+          <a:xfrm>
+            <a:off x="2068071" y="2145653"/>
+            <a:ext cx="767537" cy="815084"/>
+          </a:xfrm>
+          <a:prstGeom prst="rect">
+            <a:avLst/>
+          </a:prstGeom>
+        </p:spPr>
+      </p:pic>
+      <p:pic>
+        <p:nvPicPr>
+          <p:cNvPr id="17" name="Imagem 16">
+            <a:extLst>
+              <a:ext uri="{FF2B5EF4-FFF2-40B4-BE49-F238E27FC236}">
+                <a16:creationId xmlns:a16="http://schemas.microsoft.com/office/drawing/2014/main" id="{D09AB051-70E5-44B4-9A70-B5E09A6F537A}"/>
+              </a:ext>
+            </a:extLst>
+          </p:cNvPr>
+          <p:cNvPicPr>
+            <a:picLocks noChangeAspect="1"/>
+          </p:cNvPicPr>
+          <p:nvPr/>
+        </p:nvPicPr>
+        <p:blipFill>
+          <a:blip r:embed="rId5"/>
+          <a:stretch>
+            <a:fillRect/>
+          </a:stretch>
+        </p:blipFill>
+        <p:spPr>
+          <a:xfrm>
+            <a:off x="9167815" y="1861825"/>
+            <a:ext cx="767537" cy="815084"/>
+          </a:xfrm>
+          <a:prstGeom prst="rect">
+            <a:avLst/>
+          </a:prstGeom>
+        </p:spPr>
+      </p:pic>
+      <p:pic>
+        <p:nvPicPr>
+          <p:cNvPr id="18" name="Imagem 17">
+            <a:extLst>
+              <a:ext uri="{FF2B5EF4-FFF2-40B4-BE49-F238E27FC236}">
+                <a16:creationId xmlns:a16="http://schemas.microsoft.com/office/drawing/2014/main" id="{7633D87C-746B-4BAD-9D7B-79B08CF61D43}"/>
+              </a:ext>
+            </a:extLst>
+          </p:cNvPr>
+          <p:cNvPicPr>
+            <a:picLocks noChangeAspect="1"/>
+          </p:cNvPicPr>
+          <p:nvPr/>
+        </p:nvPicPr>
+        <p:blipFill>
+          <a:blip r:embed="rId5"/>
+          <a:stretch>
+            <a:fillRect/>
+          </a:stretch>
+        </p:blipFill>
+        <p:spPr>
+          <a:xfrm>
+            <a:off x="5984574" y="5413676"/>
+            <a:ext cx="767537" cy="815084"/>
+          </a:xfrm>
+          <a:prstGeom prst="rect">
+            <a:avLst/>
+          </a:prstGeom>
+        </p:spPr>
+      </p:pic>
+      <p:pic>
+        <p:nvPicPr>
+          <p:cNvPr id="19" name="Imagem 18">
+            <a:extLst>
+              <a:ext uri="{FF2B5EF4-FFF2-40B4-BE49-F238E27FC236}">
+                <a16:creationId xmlns:a16="http://schemas.microsoft.com/office/drawing/2014/main" id="{2906B8F9-58EE-4224-871F-55898E58C7EF}"/>
+              </a:ext>
+            </a:extLst>
+          </p:cNvPr>
+          <p:cNvPicPr>
+            <a:picLocks noChangeAspect="1"/>
+          </p:cNvPicPr>
+          <p:nvPr/>
+        </p:nvPicPr>
+        <p:blipFill>
+          <a:blip r:embed="rId5"/>
+          <a:stretch>
+            <a:fillRect/>
+          </a:stretch>
+        </p:blipFill>
+        <p:spPr>
+          <a:xfrm>
+            <a:off x="6759842" y="290635"/>
+            <a:ext cx="767537" cy="815084"/>
+          </a:xfrm>
+          <a:prstGeom prst="rect">
+            <a:avLst/>
+          </a:prstGeom>
+        </p:spPr>
+      </p:pic>
+      <p:pic>
+        <p:nvPicPr>
+          <p:cNvPr id="20" name="Imagem 19">
+            <a:extLst>
+              <a:ext uri="{FF2B5EF4-FFF2-40B4-BE49-F238E27FC236}">
+                <a16:creationId xmlns:a16="http://schemas.microsoft.com/office/drawing/2014/main" id="{246686D0-E462-49E3-98B2-F3124136A6BF}"/>
+              </a:ext>
+            </a:extLst>
+          </p:cNvPr>
+          <p:cNvPicPr>
+            <a:picLocks noChangeAspect="1"/>
+          </p:cNvPicPr>
+          <p:nvPr/>
+        </p:nvPicPr>
+        <p:blipFill>
+          <a:blip r:embed="rId6"/>
+          <a:stretch>
+            <a:fillRect/>
+          </a:stretch>
+        </p:blipFill>
+        <p:spPr>
+          <a:xfrm>
+            <a:off x="2076923" y="4427721"/>
+            <a:ext cx="548004" cy="453287"/>
+          </a:xfrm>
+          <a:prstGeom prst="rect">
+            <a:avLst/>
+          </a:prstGeom>
+        </p:spPr>
+      </p:pic>
+      <p:pic>
+        <p:nvPicPr>
+          <p:cNvPr id="21" name="Imagem 20">
+            <a:extLst>
+              <a:ext uri="{FF2B5EF4-FFF2-40B4-BE49-F238E27FC236}">
+                <a16:creationId xmlns:a16="http://schemas.microsoft.com/office/drawing/2014/main" id="{ABAC0E61-1574-42E0-93AE-00E8BBF2639F}"/>
+              </a:ext>
+            </a:extLst>
+          </p:cNvPr>
+          <p:cNvPicPr>
+            <a:picLocks noChangeAspect="1"/>
+          </p:cNvPicPr>
+          <p:nvPr/>
+        </p:nvPicPr>
+        <p:blipFill>
+          <a:blip r:embed="rId6"/>
+          <a:stretch>
+            <a:fillRect/>
+          </a:stretch>
+        </p:blipFill>
+        <p:spPr>
+          <a:xfrm>
+            <a:off x="4253903" y="6228760"/>
+            <a:ext cx="548004" cy="453287"/>
+          </a:xfrm>
+          <a:prstGeom prst="rect">
+            <a:avLst/>
+          </a:prstGeom>
+        </p:spPr>
+      </p:pic>
+      <p:pic>
+        <p:nvPicPr>
+          <p:cNvPr id="22" name="Imagem 21">
+            <a:extLst>
+              <a:ext uri="{FF2B5EF4-FFF2-40B4-BE49-F238E27FC236}">
+                <a16:creationId xmlns:a16="http://schemas.microsoft.com/office/drawing/2014/main" id="{4A20E0BB-42F6-4928-8339-8921896D21A6}"/>
+              </a:ext>
+            </a:extLst>
+          </p:cNvPr>
+          <p:cNvPicPr>
+            <a:picLocks noChangeAspect="1"/>
+          </p:cNvPicPr>
+          <p:nvPr/>
+        </p:nvPicPr>
+        <p:blipFill>
+          <a:blip r:embed="rId6"/>
+          <a:stretch>
+            <a:fillRect/>
+          </a:stretch>
+        </p:blipFill>
+        <p:spPr>
+          <a:xfrm>
+            <a:off x="7933952" y="358692"/>
+            <a:ext cx="548004" cy="453287"/>
+          </a:xfrm>
+          <a:prstGeom prst="rect">
+            <a:avLst/>
+          </a:prstGeom>
+        </p:spPr>
+      </p:pic>
+      <p:pic>
+        <p:nvPicPr>
+          <p:cNvPr id="23" name="Imagem 22">
+            <a:extLst>
+              <a:ext uri="{FF2B5EF4-FFF2-40B4-BE49-F238E27FC236}">
+                <a16:creationId xmlns:a16="http://schemas.microsoft.com/office/drawing/2014/main" id="{BD42FBA4-E530-42EE-B92A-227F1A4F91BA}"/>
+              </a:ext>
+            </a:extLst>
+          </p:cNvPr>
+          <p:cNvPicPr>
+            <a:picLocks noChangeAspect="1"/>
+          </p:cNvPicPr>
+          <p:nvPr/>
+        </p:nvPicPr>
+        <p:blipFill>
+          <a:blip r:embed="rId6"/>
+          <a:stretch>
+            <a:fillRect/>
+          </a:stretch>
+        </p:blipFill>
+        <p:spPr>
+          <a:xfrm>
+            <a:off x="2786355" y="341286"/>
+            <a:ext cx="407881" cy="337383"/>
+          </a:xfrm>
+          <a:prstGeom prst="rect">
+            <a:avLst/>
+          </a:prstGeom>
+        </p:spPr>
+      </p:pic>
+      <p:pic>
+        <p:nvPicPr>
+          <p:cNvPr id="24" name="Imagem 23">
+            <a:extLst>
+              <a:ext uri="{FF2B5EF4-FFF2-40B4-BE49-F238E27FC236}">
+                <a16:creationId xmlns:a16="http://schemas.microsoft.com/office/drawing/2014/main" id="{EF9BCE2D-3473-4DD3-AD9F-64B704AB675E}"/>
+              </a:ext>
+            </a:extLst>
+          </p:cNvPr>
+          <p:cNvPicPr>
+            <a:picLocks noChangeAspect="1"/>
+          </p:cNvPicPr>
+          <p:nvPr/>
+        </p:nvPicPr>
+        <p:blipFill>
+          <a:blip r:embed="rId6"/>
+          <a:stretch>
+            <a:fillRect/>
+          </a:stretch>
+        </p:blipFill>
+        <p:spPr>
+          <a:xfrm>
+            <a:off x="7964919" y="6002116"/>
+            <a:ext cx="548004" cy="453287"/>
+          </a:xfrm>
+          <a:prstGeom prst="rect">
+            <a:avLst/>
+          </a:prstGeom>
+        </p:spPr>
+      </p:pic>
+    </p:spTree>
+    <p:extLst>
+      <p:ext uri="{BB962C8B-B14F-4D97-AF65-F5344CB8AC3E}">
+        <p14:creationId xmlns:p14="http://schemas.microsoft.com/office/powerpoint/2010/main" val="931692508"/>
+      </p:ext>
+    </p:extLst>
+  </p:cSld>
+  <p:clrMapOvr>
+    <a:masterClrMapping/>
+  </p:clrMapOvr>
+  <mc:AlternateContent xmlns:mc="http://schemas.openxmlformats.org/markup-compatibility/2006">
+    <mc:Choice xmlns:p14="http://schemas.microsoft.com/office/powerpoint/2010/main" Requires="p14">
+      <p:transition spd="slow" p14:dur="1500">
+        <p:split orient="vert"/>
+      </p:transition>
+    </mc:Choice>
+    <mc:Fallback>
+      <p:transition spd="slow">
+        <p:split orient="vert"/>
+      </p:transition>
+    </mc:Fallback>
+  </mc:AlternateContent>
 </p:sld>
 </file>
 

</xml_diff>

<commit_message>
adicionou-se a versão final da apresentação
inserção de mais um slide sobre o ciclo do app
</commit_message>
<xml_diff>
--- a/apresentacao/Guilherme_Samuel_dos_Santos_SP_Apresentacao.pptx
+++ b/apresentacao/Guilherme_Samuel_dos_Santos_SP_Apresentacao.pptx
@@ -8,8 +8,9 @@
     <p:sldId id="256" r:id="rId2"/>
     <p:sldId id="257" r:id="rId3"/>
     <p:sldId id="258" r:id="rId4"/>
-    <p:sldId id="259" r:id="rId5"/>
-    <p:sldId id="260" r:id="rId6"/>
+    <p:sldId id="261" r:id="rId5"/>
+    <p:sldId id="259" r:id="rId6"/>
+    <p:sldId id="260" r:id="rId7"/>
   </p:sldIdLst>
   <p:sldSz cx="12192000" cy="6858000"/>
   <p:notesSz cx="6858000" cy="9144000"/>
@@ -3459,13 +3460,13 @@
   <p:clrMapOvr>
     <a:masterClrMapping/>
   </p:clrMapOvr>
-  <mc:AlternateContent xmlns:mc="http://schemas.openxmlformats.org/markup-compatibility/2006">
-    <mc:Choice xmlns:p14="http://schemas.microsoft.com/office/powerpoint/2010/main" Requires="p14">
+  <mc:AlternateContent xmlns:mc="http://schemas.openxmlformats.org/markup-compatibility/2006" xmlns:p14="http://schemas.microsoft.com/office/powerpoint/2010/main">
+    <mc:Choice Requires="p14">
       <p:transition spd="slow">
         <p14:flash/>
       </p:transition>
     </mc:Choice>
-    <mc:Fallback>
+    <mc:Fallback xmlns="">
       <p:transition spd="slow">
         <p:fade/>
       </p:transition>
@@ -4071,12 +4072,155 @@
           </a:prstGeom>
         </p:spPr>
       </p:pic>
+      <p:sp>
+        <p:nvSpPr>
+          <p:cNvPr id="17" name="CaixaDeTexto 16">
+            <a:extLst>
+              <a:ext uri="{FF2B5EF4-FFF2-40B4-BE49-F238E27FC236}">
+                <a16:creationId xmlns:a16="http://schemas.microsoft.com/office/drawing/2014/main" id="{CC10410E-F695-4527-A734-6228208776F2}"/>
+              </a:ext>
+            </a:extLst>
+          </p:cNvPr>
+          <p:cNvSpPr txBox="1"/>
+          <p:nvPr/>
+        </p:nvSpPr>
+        <p:spPr>
+          <a:xfrm>
+            <a:off x="1542936" y="5730901"/>
+            <a:ext cx="1439036" cy="369332"/>
+          </a:xfrm>
+          <a:prstGeom prst="rect">
+            <a:avLst/>
+          </a:prstGeom>
+          <a:noFill/>
+        </p:spPr>
+        <p:txBody>
+          <a:bodyPr wrap="square" rtlCol="0">
+            <a:spAutoFit/>
+          </a:bodyPr>
+          <a:lstStyle/>
+          <a:p>
+            <a:r>
+              <a:rPr lang="pt-BR" dirty="0" err="1">
+                <a:latin typeface="Montserrat Alternates ExtraBold" panose="00000900000000000000" pitchFamily="2" charset="0"/>
+              </a:rPr>
+              <a:t>Exercises</a:t>
+            </a:r>
+            <a:r>
+              <a:rPr lang="pt-BR" dirty="0">
+                <a:latin typeface="Montserrat Alternates ExtraBold" panose="00000900000000000000" pitchFamily="2" charset="0"/>
+              </a:rPr>
+              <a:t>!</a:t>
+            </a:r>
+          </a:p>
+        </p:txBody>
+      </p:sp>
+      <p:sp>
+        <p:nvSpPr>
+          <p:cNvPr id="10" name="CaixaDeTexto 9">
+            <a:extLst>
+              <a:ext uri="{FF2B5EF4-FFF2-40B4-BE49-F238E27FC236}">
+                <a16:creationId xmlns:a16="http://schemas.microsoft.com/office/drawing/2014/main" id="{C100A73C-C522-4BFD-88E0-D56AF434EAAF}"/>
+              </a:ext>
+            </a:extLst>
+          </p:cNvPr>
+          <p:cNvSpPr txBox="1"/>
+          <p:nvPr/>
+        </p:nvSpPr>
+        <p:spPr>
+          <a:xfrm>
+            <a:off x="4196151" y="5767987"/>
+            <a:ext cx="1439036" cy="369332"/>
+          </a:xfrm>
+          <a:prstGeom prst="rect">
+            <a:avLst/>
+          </a:prstGeom>
+          <a:noFill/>
+        </p:spPr>
+        <p:txBody>
+          <a:bodyPr wrap="square" rtlCol="0">
+            <a:spAutoFit/>
+          </a:bodyPr>
+          <a:lstStyle/>
+          <a:p>
+            <a:pPr algn="ctr"/>
+            <a:r>
+              <a:rPr lang="pt-BR" dirty="0" err="1">
+                <a:latin typeface="Montserrat Alternates ExtraBold" panose="00000900000000000000" pitchFamily="2" charset="0"/>
+              </a:rPr>
+              <a:t>Custom</a:t>
+            </a:r>
+            <a:r>
+              <a:rPr lang="pt-BR" dirty="0">
+                <a:latin typeface="Montserrat Alternates ExtraBold" panose="00000900000000000000" pitchFamily="2" charset="0"/>
+              </a:rPr>
+              <a:t>!</a:t>
+            </a:r>
+          </a:p>
+        </p:txBody>
+      </p:sp>
+      <p:sp>
+        <p:nvSpPr>
+          <p:cNvPr id="11" name="CaixaDeTexto 10">
+            <a:extLst>
+              <a:ext uri="{FF2B5EF4-FFF2-40B4-BE49-F238E27FC236}">
+                <a16:creationId xmlns:a16="http://schemas.microsoft.com/office/drawing/2014/main" id="{A01DF57F-72C5-4C6C-9CB4-EE0C3DAC81C0}"/>
+              </a:ext>
+            </a:extLst>
+          </p:cNvPr>
+          <p:cNvSpPr txBox="1"/>
+          <p:nvPr/>
+        </p:nvSpPr>
+        <p:spPr>
+          <a:xfrm>
+            <a:off x="7162800" y="5730901"/>
+            <a:ext cx="1439036" cy="646331"/>
+          </a:xfrm>
+          <a:prstGeom prst="rect">
+            <a:avLst/>
+          </a:prstGeom>
+          <a:noFill/>
+        </p:spPr>
+        <p:txBody>
+          <a:bodyPr wrap="square" rtlCol="0">
+            <a:spAutoFit/>
+          </a:bodyPr>
+          <a:lstStyle/>
+          <a:p>
+            <a:pPr algn="ctr"/>
+            <a:r>
+              <a:rPr lang="pt-BR" dirty="0" err="1">
+                <a:latin typeface="Montserrat Alternates ExtraBold" panose="00000900000000000000" pitchFamily="2" charset="0"/>
+              </a:rPr>
+              <a:t>Know</a:t>
+            </a:r>
+            <a:r>
+              <a:rPr lang="pt-BR" dirty="0">
+                <a:latin typeface="Montserrat Alternates ExtraBold" panose="00000900000000000000" pitchFamily="2" charset="0"/>
+              </a:rPr>
+              <a:t> </a:t>
+            </a:r>
+            <a:r>
+              <a:rPr lang="pt-BR" dirty="0" err="1">
+                <a:latin typeface="Montserrat Alternates ExtraBold" panose="00000900000000000000" pitchFamily="2" charset="0"/>
+              </a:rPr>
+              <a:t>yourself</a:t>
+            </a:r>
+            <a:r>
+              <a:rPr lang="pt-BR" dirty="0">
+                <a:latin typeface="Montserrat Alternates ExtraBold" panose="00000900000000000000" pitchFamily="2" charset="0"/>
+              </a:rPr>
+              <a:t>!</a:t>
+            </a:r>
+          </a:p>
+        </p:txBody>
+      </p:sp>
       <p:pic>
         <p:nvPicPr>
-          <p:cNvPr id="16" name="Imagem 15">
-            <a:extLst>
-              <a:ext uri="{FF2B5EF4-FFF2-40B4-BE49-F238E27FC236}">
-                <a16:creationId xmlns:a16="http://schemas.microsoft.com/office/drawing/2014/main" id="{AA17309A-AD20-4102-A6A4-85674380B929}"/>
+          <p:cNvPr id="13" name="Imagem 12">
+            <a:extLst>
+              <a:ext uri="{FF2B5EF4-FFF2-40B4-BE49-F238E27FC236}">
+                <a16:creationId xmlns:a16="http://schemas.microsoft.com/office/drawing/2014/main" id="{C6BEA2B6-8EA3-460B-B331-BB2BF1EA2033}"/>
               </a:ext>
             </a:extLst>
           </p:cNvPr>
@@ -4099,157 +4243,20 @@
         </p:blipFill>
         <p:spPr>
           <a:xfrm>
-            <a:off x="4100478" y="2061960"/>
-            <a:ext cx="1630383" cy="3534571"/>
+            <a:off x="574407" y="340325"/>
+            <a:ext cx="2453257" cy="1009720"/>
           </a:xfrm>
           <a:prstGeom prst="rect">
             <a:avLst/>
           </a:prstGeom>
         </p:spPr>
       </p:pic>
-      <p:sp>
-        <p:nvSpPr>
-          <p:cNvPr id="17" name="CaixaDeTexto 16">
-            <a:extLst>
-              <a:ext uri="{FF2B5EF4-FFF2-40B4-BE49-F238E27FC236}">
-                <a16:creationId xmlns:a16="http://schemas.microsoft.com/office/drawing/2014/main" id="{CC10410E-F695-4527-A734-6228208776F2}"/>
-              </a:ext>
-            </a:extLst>
-          </p:cNvPr>
-          <p:cNvSpPr txBox="1"/>
-          <p:nvPr/>
-        </p:nvSpPr>
-        <p:spPr>
-          <a:xfrm>
-            <a:off x="1542936" y="5730901"/>
-            <a:ext cx="1439036" cy="369332"/>
-          </a:xfrm>
-          <a:prstGeom prst="rect">
-            <a:avLst/>
-          </a:prstGeom>
-          <a:noFill/>
-        </p:spPr>
-        <p:txBody>
-          <a:bodyPr wrap="square" rtlCol="0">
-            <a:spAutoFit/>
-          </a:bodyPr>
-          <a:lstStyle/>
-          <a:p>
-            <a:r>
-              <a:rPr lang="pt-BR" dirty="0" err="1">
-                <a:latin typeface="Montserrat Alternates ExtraBold" panose="00000900000000000000" pitchFamily="2" charset="0"/>
-              </a:rPr>
-              <a:t>Exercises</a:t>
-            </a:r>
-            <a:r>
-              <a:rPr lang="pt-BR" dirty="0">
-                <a:latin typeface="Montserrat Alternates ExtraBold" panose="00000900000000000000" pitchFamily="2" charset="0"/>
-              </a:rPr>
-              <a:t>!</a:t>
-            </a:r>
-          </a:p>
-        </p:txBody>
-      </p:sp>
-      <p:sp>
-        <p:nvSpPr>
-          <p:cNvPr id="10" name="CaixaDeTexto 9">
-            <a:extLst>
-              <a:ext uri="{FF2B5EF4-FFF2-40B4-BE49-F238E27FC236}">
-                <a16:creationId xmlns:a16="http://schemas.microsoft.com/office/drawing/2014/main" id="{C100A73C-C522-4BFD-88E0-D56AF434EAAF}"/>
-              </a:ext>
-            </a:extLst>
-          </p:cNvPr>
-          <p:cNvSpPr txBox="1"/>
-          <p:nvPr/>
-        </p:nvSpPr>
-        <p:spPr>
-          <a:xfrm>
-            <a:off x="4196151" y="5767987"/>
-            <a:ext cx="1439036" cy="369332"/>
-          </a:xfrm>
-          <a:prstGeom prst="rect">
-            <a:avLst/>
-          </a:prstGeom>
-          <a:noFill/>
-        </p:spPr>
-        <p:txBody>
-          <a:bodyPr wrap="square" rtlCol="0">
-            <a:spAutoFit/>
-          </a:bodyPr>
-          <a:lstStyle/>
-          <a:p>
-            <a:pPr algn="ctr"/>
-            <a:r>
-              <a:rPr lang="pt-BR" dirty="0">
-                <a:latin typeface="Montserrat Alternates ExtraBold" panose="00000900000000000000" pitchFamily="2" charset="0"/>
-              </a:rPr>
-              <a:t>Shop!</a:t>
-            </a:r>
-          </a:p>
-        </p:txBody>
-      </p:sp>
-      <p:sp>
-        <p:nvSpPr>
-          <p:cNvPr id="11" name="CaixaDeTexto 10">
-            <a:extLst>
-              <a:ext uri="{FF2B5EF4-FFF2-40B4-BE49-F238E27FC236}">
-                <a16:creationId xmlns:a16="http://schemas.microsoft.com/office/drawing/2014/main" id="{A01DF57F-72C5-4C6C-9CB4-EE0C3DAC81C0}"/>
-              </a:ext>
-            </a:extLst>
-          </p:cNvPr>
-          <p:cNvSpPr txBox="1"/>
-          <p:nvPr/>
-        </p:nvSpPr>
-        <p:spPr>
-          <a:xfrm>
-            <a:off x="7162800" y="5730901"/>
-            <a:ext cx="1439036" cy="646331"/>
-          </a:xfrm>
-          <a:prstGeom prst="rect">
-            <a:avLst/>
-          </a:prstGeom>
-          <a:noFill/>
-        </p:spPr>
-        <p:txBody>
-          <a:bodyPr wrap="square" rtlCol="0">
-            <a:spAutoFit/>
-          </a:bodyPr>
-          <a:lstStyle/>
-          <a:p>
-            <a:pPr algn="ctr"/>
-            <a:r>
-              <a:rPr lang="pt-BR" dirty="0" err="1">
-                <a:latin typeface="Montserrat Alternates ExtraBold" panose="00000900000000000000" pitchFamily="2" charset="0"/>
-              </a:rPr>
-              <a:t>Know</a:t>
-            </a:r>
-            <a:r>
-              <a:rPr lang="pt-BR" dirty="0">
-                <a:latin typeface="Montserrat Alternates ExtraBold" panose="00000900000000000000" pitchFamily="2" charset="0"/>
-              </a:rPr>
-              <a:t> </a:t>
-            </a:r>
-            <a:r>
-              <a:rPr lang="pt-BR" dirty="0" err="1">
-                <a:latin typeface="Montserrat Alternates ExtraBold" panose="00000900000000000000" pitchFamily="2" charset="0"/>
-              </a:rPr>
-              <a:t>yourself</a:t>
-            </a:r>
-            <a:r>
-              <a:rPr lang="pt-BR" dirty="0">
-                <a:latin typeface="Montserrat Alternates ExtraBold" panose="00000900000000000000" pitchFamily="2" charset="0"/>
-              </a:rPr>
-              <a:t>!</a:t>
-            </a:r>
-          </a:p>
-        </p:txBody>
-      </p:sp>
       <p:pic>
         <p:nvPicPr>
-          <p:cNvPr id="13" name="Imagem 12">
-            <a:extLst>
-              <a:ext uri="{FF2B5EF4-FFF2-40B4-BE49-F238E27FC236}">
-                <a16:creationId xmlns:a16="http://schemas.microsoft.com/office/drawing/2014/main" id="{C6BEA2B6-8EA3-460B-B331-BB2BF1EA2033}"/>
+          <p:cNvPr id="3" name="Imagem 2">
+            <a:extLst>
+              <a:ext uri="{FF2B5EF4-FFF2-40B4-BE49-F238E27FC236}">
+                <a16:creationId xmlns:a16="http://schemas.microsoft.com/office/drawing/2014/main" id="{9AAC1D71-C8DE-4233-86D5-C1A945738B18}"/>
               </a:ext>
             </a:extLst>
           </p:cNvPr>
@@ -4272,8 +4279,8 @@
         </p:blipFill>
         <p:spPr>
           <a:xfrm>
-            <a:off x="574407" y="340325"/>
-            <a:ext cx="2453257" cy="1009720"/>
+            <a:off x="4191001" y="2061960"/>
+            <a:ext cx="1630383" cy="3534571"/>
           </a:xfrm>
           <a:prstGeom prst="rect">
             <a:avLst/>
@@ -4290,9 +4297,18 @@
   <p:clrMapOvr>
     <a:masterClrMapping/>
   </p:clrMapOvr>
-  <p:transition spd="slow">
-    <p:cover/>
-  </p:transition>
+  <mc:AlternateContent xmlns:mc="http://schemas.openxmlformats.org/markup-compatibility/2006">
+    <mc:Choice xmlns:p14="http://schemas.microsoft.com/office/powerpoint/2010/main" Requires="p14">
+      <p:transition spd="slow" p14:dur="800">
+        <p:circle/>
+      </p:transition>
+    </mc:Choice>
+    <mc:Fallback>
+      <p:transition spd="slow">
+        <p:circle/>
+      </p:transition>
+    </mc:Fallback>
+  </mc:AlternateContent>
 </p:sld>
 </file>
 
@@ -4315,26 +4331,229 @@
       </p:grpSpPr>
       <p:sp>
         <p:nvSpPr>
-          <p:cNvPr id="4" name="Retângulo 3">
-            <a:extLst>
-              <a:ext uri="{FF2B5EF4-FFF2-40B4-BE49-F238E27FC236}">
-                <a16:creationId xmlns:a16="http://schemas.microsoft.com/office/drawing/2014/main" id="{853E865E-546C-4B53-A92E-E1CB442BF142}"/>
-              </a:ext>
-            </a:extLst>
-          </p:cNvPr>
-          <p:cNvSpPr/>
+          <p:cNvPr id="6" name="CaixaDeTexto 5">
+            <a:extLst>
+              <a:ext uri="{FF2B5EF4-FFF2-40B4-BE49-F238E27FC236}">
+                <a16:creationId xmlns:a16="http://schemas.microsoft.com/office/drawing/2014/main" id="{E7F00FCA-2339-4457-837D-3F0B366728C3}"/>
+              </a:ext>
+            </a:extLst>
+          </p:cNvPr>
+          <p:cNvSpPr txBox="1"/>
           <p:nvPr/>
         </p:nvSpPr>
         <p:spPr>
           <a:xfrm>
-            <a:off x="0" y="0"/>
-            <a:ext cx="12192000" cy="6858000"/>
+            <a:off x="4191001" y="434071"/>
+            <a:ext cx="5943599" cy="646331"/>
           </a:xfrm>
           <a:prstGeom prst="rect">
             <a:avLst/>
           </a:prstGeom>
+          <a:noFill/>
+        </p:spPr>
+        <p:txBody>
+          <a:bodyPr wrap="square" rtlCol="0">
+            <a:spAutoFit/>
+          </a:bodyPr>
+          <a:lstStyle/>
+          <a:p>
+            <a:r>
+              <a:rPr lang="pt-BR" sz="3600" dirty="0">
+                <a:solidFill>
+                  <a:schemeClr val="bg1"/>
+                </a:solidFill>
+                <a:latin typeface="Montserrat Alternates ExtraBold" panose="00000900000000000000" pitchFamily="2" charset="0"/>
+              </a:rPr>
+              <a:t>Principais Funções</a:t>
+            </a:r>
+          </a:p>
+        </p:txBody>
+      </p:sp>
+      <p:sp>
+        <p:nvSpPr>
+          <p:cNvPr id="4" name="CaixaDeTexto 3">
+            <a:extLst>
+              <a:ext uri="{FF2B5EF4-FFF2-40B4-BE49-F238E27FC236}">
+                <a16:creationId xmlns:a16="http://schemas.microsoft.com/office/drawing/2014/main" id="{4E48BD21-25EE-4751-8FEC-F2657BB491BF}"/>
+              </a:ext>
+            </a:extLst>
+          </p:cNvPr>
+          <p:cNvSpPr txBox="1"/>
+          <p:nvPr/>
+        </p:nvSpPr>
+        <p:spPr>
+          <a:xfrm>
+            <a:off x="523875" y="2102226"/>
+            <a:ext cx="4162425" cy="2585323"/>
+          </a:xfrm>
+          <a:prstGeom prst="rect">
+            <a:avLst/>
+          </a:prstGeom>
+          <a:noFill/>
+        </p:spPr>
+        <p:txBody>
+          <a:bodyPr wrap="square" rtlCol="0">
+            <a:spAutoFit/>
+          </a:bodyPr>
+          <a:lstStyle/>
+          <a:p>
+            <a:r>
+              <a:rPr lang="pt-BR" dirty="0">
+                <a:solidFill>
+                  <a:schemeClr val="bg1"/>
+                </a:solidFill>
+                <a:latin typeface="Montserrat Alternates ExtraBold" panose="00000900000000000000" pitchFamily="2" charset="0"/>
+              </a:rPr>
+              <a:t>VitaHealth possui as seguintes funções:</a:t>
+            </a:r>
+          </a:p>
+          <a:p>
+            <a:endParaRPr lang="pt-BR" dirty="0">
+              <a:solidFill>
+                <a:schemeClr val="bg1"/>
+              </a:solidFill>
+              <a:latin typeface="Montserrat Alternates ExtraBold" panose="00000900000000000000" pitchFamily="2" charset="0"/>
+            </a:endParaRPr>
+          </a:p>
+          <a:p>
+            <a:pPr marL="285750" indent="-285750">
+              <a:buFont typeface="Arial" panose="020B0604020202020204" pitchFamily="34" charset="0"/>
+              <a:buChar char="•"/>
+            </a:pPr>
+            <a:r>
+              <a:rPr lang="pt-BR" dirty="0">
+                <a:solidFill>
+                  <a:schemeClr val="bg1"/>
+                </a:solidFill>
+                <a:latin typeface="Montserrat Alternates ExtraBold" panose="00000900000000000000" pitchFamily="2" charset="0"/>
+              </a:rPr>
+              <a:t>Incentivar todos a terem uma melhor condição de vida;</a:t>
+            </a:r>
+          </a:p>
+          <a:p>
+            <a:pPr marL="285750" indent="-285750">
+              <a:buFont typeface="Arial" panose="020B0604020202020204" pitchFamily="34" charset="0"/>
+              <a:buChar char="•"/>
+            </a:pPr>
+            <a:endParaRPr lang="pt-BR" dirty="0">
+              <a:solidFill>
+                <a:schemeClr val="bg1"/>
+              </a:solidFill>
+              <a:latin typeface="Montserrat Alternates ExtraBold" panose="00000900000000000000" pitchFamily="2" charset="0"/>
+            </a:endParaRPr>
+          </a:p>
+          <a:p>
+            <a:pPr marL="285750" indent="-285750">
+              <a:buFont typeface="Arial" panose="020B0604020202020204" pitchFamily="34" charset="0"/>
+              <a:buChar char="•"/>
+            </a:pPr>
+            <a:r>
+              <a:rPr lang="pt-BR" dirty="0">
+                <a:solidFill>
+                  <a:schemeClr val="bg1"/>
+                </a:solidFill>
+                <a:latin typeface="Montserrat Alternates ExtraBold" panose="00000900000000000000" pitchFamily="2" charset="0"/>
+              </a:rPr>
+              <a:t>Estimular exercícios diários em todos os seus usuários.</a:t>
+            </a:r>
+          </a:p>
+          <a:p>
+            <a:pPr marL="285750" indent="-285750">
+              <a:buFont typeface="Arial" panose="020B0604020202020204" pitchFamily="34" charset="0"/>
+              <a:buChar char="•"/>
+            </a:pPr>
+            <a:endParaRPr lang="pt-BR" dirty="0"/>
+          </a:p>
+        </p:txBody>
+      </p:sp>
+      <p:pic>
+        <p:nvPicPr>
+          <p:cNvPr id="5" name="Imagem 4">
+            <a:extLst>
+              <a:ext uri="{FF2B5EF4-FFF2-40B4-BE49-F238E27FC236}">
+                <a16:creationId xmlns:a16="http://schemas.microsoft.com/office/drawing/2014/main" id="{C39A3145-D192-4085-9D95-DE2A9AC38CA9}"/>
+              </a:ext>
+            </a:extLst>
+          </p:cNvPr>
+          <p:cNvPicPr>
+            <a:picLocks noChangeAspect="1"/>
+          </p:cNvPicPr>
+          <p:nvPr/>
+        </p:nvPicPr>
+        <p:blipFill>
+          <a:blip r:embed="rId2"/>
+          <a:stretch>
+            <a:fillRect/>
+          </a:stretch>
+        </p:blipFill>
+        <p:spPr>
+          <a:xfrm>
+            <a:off x="7162800" y="-4215"/>
+            <a:ext cx="5019675" cy="6862215"/>
+          </a:xfrm>
+          <a:prstGeom prst="rect">
+            <a:avLst/>
+          </a:prstGeom>
+        </p:spPr>
+      </p:pic>
+      <p:pic>
+        <p:nvPicPr>
+          <p:cNvPr id="13" name="Imagem 12">
+            <a:extLst>
+              <a:ext uri="{FF2B5EF4-FFF2-40B4-BE49-F238E27FC236}">
+                <a16:creationId xmlns:a16="http://schemas.microsoft.com/office/drawing/2014/main" id="{C6BEA2B6-8EA3-460B-B331-BB2BF1EA2033}"/>
+              </a:ext>
+            </a:extLst>
+          </p:cNvPr>
+          <p:cNvPicPr>
+            <a:picLocks noChangeAspect="1"/>
+          </p:cNvPicPr>
+          <p:nvPr/>
+        </p:nvPicPr>
+        <p:blipFill>
+          <a:blip r:embed="rId3">
+            <a:extLst>
+              <a:ext uri="{28A0092B-C50C-407E-A947-70E740481C1C}">
+                <a14:useLocalDpi xmlns:a14="http://schemas.microsoft.com/office/drawing/2010/main" val="0"/>
+              </a:ext>
+            </a:extLst>
+          </a:blip>
+          <a:stretch>
+            <a:fillRect/>
+          </a:stretch>
+        </p:blipFill>
+        <p:spPr>
+          <a:xfrm>
+            <a:off x="7535977" y="449071"/>
+            <a:ext cx="2453257" cy="1009720"/>
+          </a:xfrm>
+          <a:prstGeom prst="rect">
+            <a:avLst/>
+          </a:prstGeom>
+        </p:spPr>
+      </p:pic>
+      <p:sp>
+        <p:nvSpPr>
+          <p:cNvPr id="2" name="Seta: Curva para Baixo 1">
+            <a:extLst>
+              <a:ext uri="{FF2B5EF4-FFF2-40B4-BE49-F238E27FC236}">
+                <a16:creationId xmlns:a16="http://schemas.microsoft.com/office/drawing/2014/main" id="{58D92162-BC7C-4E58-B23C-D171C463D255}"/>
+              </a:ext>
+            </a:extLst>
+          </p:cNvPr>
+          <p:cNvSpPr/>
+          <p:nvPr/>
+        </p:nvSpPr>
+        <p:spPr>
+          <a:xfrm>
+            <a:off x="2402594" y="1515081"/>
+            <a:ext cx="2046914" cy="1009720"/>
+          </a:xfrm>
+          <a:prstGeom prst="curvedDownArrow">
+            <a:avLst/>
+          </a:prstGeom>
           <a:solidFill>
-            <a:srgbClr val="3A3A3C"/>
+            <a:srgbClr val="FF4538"/>
           </a:solidFill>
           <a:ln>
             <a:noFill/>
@@ -4361,56 +4580,20 @@
           <a:lstStyle/>
           <a:p>
             <a:pPr algn="ctr"/>
-            <a:endParaRPr lang="pt-BR"/>
-          </a:p>
-        </p:txBody>
-      </p:sp>
-      <p:sp>
-        <p:nvSpPr>
-          <p:cNvPr id="6" name="CaixaDeTexto 5">
-            <a:extLst>
-              <a:ext uri="{FF2B5EF4-FFF2-40B4-BE49-F238E27FC236}">
-                <a16:creationId xmlns:a16="http://schemas.microsoft.com/office/drawing/2014/main" id="{E7F00FCA-2339-4457-837D-3F0B366728C3}"/>
-              </a:ext>
-            </a:extLst>
-          </p:cNvPr>
-          <p:cNvSpPr txBox="1"/>
-          <p:nvPr/>
-        </p:nvSpPr>
-        <p:spPr>
-          <a:xfrm>
-            <a:off x="3905165" y="2271213"/>
-            <a:ext cx="4411588" cy="369332"/>
-          </a:xfrm>
-          <a:prstGeom prst="rect">
-            <a:avLst/>
-          </a:prstGeom>
-          <a:noFill/>
-        </p:spPr>
-        <p:txBody>
-          <a:bodyPr wrap="square" rtlCol="0">
-            <a:spAutoFit/>
-          </a:bodyPr>
-          <a:lstStyle/>
-          <a:p>
-            <a:r>
-              <a:rPr lang="pt-BR" dirty="0">
-                <a:solidFill>
-                  <a:schemeClr val="bg1"/>
-                </a:solidFill>
-                <a:latin typeface="Montserrat Alternates ExtraBold" panose="00000900000000000000" pitchFamily="2" charset="0"/>
-              </a:rPr>
-              <a:t>Requisitos para rodar o aplicativo</a:t>
-            </a:r>
+            <a:endParaRPr lang="pt-BR">
+              <a:solidFill>
+                <a:schemeClr val="tx1"/>
+              </a:solidFill>
+            </a:endParaRPr>
           </a:p>
         </p:txBody>
       </p:sp>
       <p:pic>
         <p:nvPicPr>
-          <p:cNvPr id="3" name="Imagem 2">
-            <a:extLst>
-              <a:ext uri="{FF2B5EF4-FFF2-40B4-BE49-F238E27FC236}">
-                <a16:creationId xmlns:a16="http://schemas.microsoft.com/office/drawing/2014/main" id="{61CFC1CB-6889-4097-B9F4-6BF5927268F1}"/>
+          <p:cNvPr id="7" name="Imagem 6">
+            <a:extLst>
+              <a:ext uri="{FF2B5EF4-FFF2-40B4-BE49-F238E27FC236}">
+                <a16:creationId xmlns:a16="http://schemas.microsoft.com/office/drawing/2014/main" id="{4B7AA9AC-001E-4B7B-B83A-5DAE60333B27}"/>
               </a:ext>
             </a:extLst>
           </p:cNvPr>
@@ -4420,7 +4603,7 @@
           <p:nvPr/>
         </p:nvPicPr>
         <p:blipFill>
-          <a:blip r:embed="rId2">
+          <a:blip r:embed="rId4">
             <a:extLst>
               <a:ext uri="{28A0092B-C50C-407E-A947-70E740481C1C}">
                 <a14:useLocalDpi xmlns:a14="http://schemas.microsoft.com/office/drawing/2010/main" val="0"/>
@@ -4433,36 +4616,108 @@
         </p:blipFill>
         <p:spPr>
           <a:xfrm>
-            <a:off x="4253768" y="324354"/>
-            <a:ext cx="3684464" cy="1622505"/>
+            <a:off x="884738" y="645143"/>
+            <a:ext cx="997254" cy="2161986"/>
           </a:xfrm>
           <a:prstGeom prst="rect">
             <a:avLst/>
           </a:prstGeom>
         </p:spPr>
       </p:pic>
-      <p:sp>
-        <p:nvSpPr>
-          <p:cNvPr id="8" name="Retângulo 7">
-            <a:extLst>
-              <a:ext uri="{FF2B5EF4-FFF2-40B4-BE49-F238E27FC236}">
-                <a16:creationId xmlns:a16="http://schemas.microsoft.com/office/drawing/2014/main" id="{E28103B2-CB44-4678-B1C2-AE5D46F99800}"/>
-              </a:ext>
-            </a:extLst>
-          </p:cNvPr>
-          <p:cNvSpPr/>
+      <p:pic>
+        <p:nvPicPr>
+          <p:cNvPr id="20" name="Imagem 19">
+            <a:extLst>
+              <a:ext uri="{FF2B5EF4-FFF2-40B4-BE49-F238E27FC236}">
+                <a16:creationId xmlns:a16="http://schemas.microsoft.com/office/drawing/2014/main" id="{933E16AE-15A3-486F-8978-F4C3EA4525F1}"/>
+              </a:ext>
+            </a:extLst>
+          </p:cNvPr>
+          <p:cNvPicPr>
+            <a:picLocks noChangeAspect="1"/>
+          </p:cNvPicPr>
           <p:nvPr/>
-        </p:nvSpPr>
-        <p:spPr>
-          <a:xfrm>
-            <a:off x="6065240" y="2818701"/>
-            <a:ext cx="45719" cy="3884103"/>
+        </p:nvPicPr>
+        <p:blipFill>
+          <a:blip r:embed="rId5">
+            <a:extLst>
+              <a:ext uri="{28A0092B-C50C-407E-A947-70E740481C1C}">
+                <a14:useLocalDpi xmlns:a14="http://schemas.microsoft.com/office/drawing/2010/main" val="0"/>
+              </a:ext>
+            </a:extLst>
+          </a:blip>
+          <a:stretch>
+            <a:fillRect/>
+          </a:stretch>
+        </p:blipFill>
+        <p:spPr>
+          <a:xfrm>
+            <a:off x="3087941" y="2748916"/>
+            <a:ext cx="1461558" cy="3168568"/>
           </a:xfrm>
           <a:prstGeom prst="rect">
             <a:avLst/>
           </a:prstGeom>
+        </p:spPr>
+      </p:pic>
+      <p:pic>
+        <p:nvPicPr>
+          <p:cNvPr id="22" name="Imagem 21">
+            <a:extLst>
+              <a:ext uri="{FF2B5EF4-FFF2-40B4-BE49-F238E27FC236}">
+                <a16:creationId xmlns:a16="http://schemas.microsoft.com/office/drawing/2014/main" id="{0C59F1B6-A4A8-4004-A5C7-CDE78ABF436D}"/>
+              </a:ext>
+            </a:extLst>
+          </p:cNvPr>
+          <p:cNvPicPr>
+            <a:picLocks noChangeAspect="1"/>
+          </p:cNvPicPr>
+          <p:nvPr/>
+        </p:nvPicPr>
+        <p:blipFill>
+          <a:blip r:embed="rId6">
+            <a:extLst>
+              <a:ext uri="{28A0092B-C50C-407E-A947-70E740481C1C}">
+                <a14:useLocalDpi xmlns:a14="http://schemas.microsoft.com/office/drawing/2010/main" val="0"/>
+              </a:ext>
+            </a:extLst>
+          </a:blip>
+          <a:stretch>
+            <a:fillRect/>
+          </a:stretch>
+        </p:blipFill>
+        <p:spPr>
+          <a:xfrm>
+            <a:off x="5769031" y="1966424"/>
+            <a:ext cx="1197159" cy="2595368"/>
+          </a:xfrm>
+          <a:prstGeom prst="rect">
+            <a:avLst/>
+          </a:prstGeom>
+        </p:spPr>
+      </p:pic>
+      <p:sp>
+        <p:nvSpPr>
+          <p:cNvPr id="23" name="Seta: Curva para Baixo 22">
+            <a:extLst>
+              <a:ext uri="{FF2B5EF4-FFF2-40B4-BE49-F238E27FC236}">
+                <a16:creationId xmlns:a16="http://schemas.microsoft.com/office/drawing/2014/main" id="{C693AE45-EC0C-4313-BBAB-2676334080A2}"/>
+              </a:ext>
+            </a:extLst>
+          </p:cNvPr>
+          <p:cNvSpPr/>
+          <p:nvPr/>
+        </p:nvSpPr>
+        <p:spPr>
+          <a:xfrm rot="8518774" flipH="1">
+            <a:off x="4555687" y="5204513"/>
+            <a:ext cx="2060742" cy="1009720"/>
+          </a:xfrm>
+          <a:prstGeom prst="curvedDownArrow">
+            <a:avLst/>
+          </a:prstGeom>
           <a:solidFill>
-            <a:schemeClr val="bg1"/>
+            <a:srgbClr val="FF4538"/>
           </a:solidFill>
           <a:ln>
             <a:noFill/>
@@ -4489,236 +4744,27 @@
           <a:lstStyle/>
           <a:p>
             <a:pPr algn="ctr"/>
-            <a:endParaRPr lang="pt-BR"/>
-          </a:p>
-        </p:txBody>
-      </p:sp>
-      <p:pic>
-        <p:nvPicPr>
-          <p:cNvPr id="9" name="Imagem 8">
-            <a:extLst>
-              <a:ext uri="{FF2B5EF4-FFF2-40B4-BE49-F238E27FC236}">
-                <a16:creationId xmlns:a16="http://schemas.microsoft.com/office/drawing/2014/main" id="{7A60566A-7DDE-4BAE-BF7F-D0CA60A672C4}"/>
-              </a:ext>
-            </a:extLst>
-          </p:cNvPr>
-          <p:cNvPicPr>
-            <a:picLocks noChangeAspect="1"/>
-          </p:cNvPicPr>
-          <p:nvPr/>
-        </p:nvPicPr>
-        <p:blipFill>
-          <a:blip r:embed="rId3"/>
-          <a:stretch>
-            <a:fillRect/>
-          </a:stretch>
-        </p:blipFill>
-        <p:spPr>
-          <a:xfrm>
-            <a:off x="220026" y="3341034"/>
-            <a:ext cx="5353797" cy="1752845"/>
-          </a:xfrm>
-          <a:prstGeom prst="rect">
-            <a:avLst/>
-          </a:prstGeom>
-        </p:spPr>
-      </p:pic>
-      <p:pic>
-        <p:nvPicPr>
-          <p:cNvPr id="10" name="Imagem 9">
-            <a:extLst>
-              <a:ext uri="{FF2B5EF4-FFF2-40B4-BE49-F238E27FC236}">
-                <a16:creationId xmlns:a16="http://schemas.microsoft.com/office/drawing/2014/main" id="{D5FB049D-90F1-463A-B9AB-16B97222B41E}"/>
-              </a:ext>
-            </a:extLst>
-          </p:cNvPr>
-          <p:cNvPicPr>
-            <a:picLocks noChangeAspect="1"/>
-          </p:cNvPicPr>
-          <p:nvPr/>
-        </p:nvPicPr>
-        <p:blipFill>
-          <a:blip r:embed="rId4"/>
-          <a:stretch>
-            <a:fillRect/>
-          </a:stretch>
-        </p:blipFill>
-        <p:spPr>
-          <a:xfrm>
-            <a:off x="7093792" y="3596586"/>
-            <a:ext cx="4115374" cy="1152686"/>
-          </a:xfrm>
-          <a:prstGeom prst="rect">
-            <a:avLst/>
-          </a:prstGeom>
-        </p:spPr>
-      </p:pic>
-      <p:pic>
-        <p:nvPicPr>
-          <p:cNvPr id="12" name="Imagem 11">
-            <a:extLst>
-              <a:ext uri="{FF2B5EF4-FFF2-40B4-BE49-F238E27FC236}">
-                <a16:creationId xmlns:a16="http://schemas.microsoft.com/office/drawing/2014/main" id="{CD017CD3-58CE-4DE2-A6E3-7E3C3C637509}"/>
-              </a:ext>
-            </a:extLst>
-          </p:cNvPr>
-          <p:cNvPicPr>
-            <a:picLocks noChangeAspect="1"/>
-          </p:cNvPicPr>
-          <p:nvPr/>
-        </p:nvPicPr>
-        <p:blipFill>
-          <a:blip r:embed="rId5">
-            <a:extLst>
-              <a:ext uri="{28A0092B-C50C-407E-A947-70E740481C1C}">
-                <a14:useLocalDpi xmlns:a14="http://schemas.microsoft.com/office/drawing/2010/main" val="0"/>
-              </a:ext>
-            </a:extLst>
-          </a:blip>
-          <a:stretch>
-            <a:fillRect/>
-          </a:stretch>
-        </p:blipFill>
-        <p:spPr>
-          <a:xfrm>
-            <a:off x="5388398" y="4908454"/>
-            <a:ext cx="370850" cy="370850"/>
-          </a:xfrm>
-          <a:prstGeom prst="rect">
-            <a:avLst/>
-          </a:prstGeom>
-        </p:spPr>
-      </p:pic>
-      <p:pic>
-        <p:nvPicPr>
-          <p:cNvPr id="13" name="Imagem 12">
-            <a:extLst>
-              <a:ext uri="{FF2B5EF4-FFF2-40B4-BE49-F238E27FC236}">
-                <a16:creationId xmlns:a16="http://schemas.microsoft.com/office/drawing/2014/main" id="{2F6E7C70-48BB-445C-B613-69486461D6F4}"/>
-              </a:ext>
-            </a:extLst>
-          </p:cNvPr>
-          <p:cNvPicPr>
-            <a:picLocks noChangeAspect="1"/>
-          </p:cNvPicPr>
-          <p:nvPr/>
-        </p:nvPicPr>
-        <p:blipFill>
-          <a:blip r:embed="rId5">
-            <a:extLst>
-              <a:ext uri="{28A0092B-C50C-407E-A947-70E740481C1C}">
-                <a14:useLocalDpi xmlns:a14="http://schemas.microsoft.com/office/drawing/2010/main" val="0"/>
-              </a:ext>
-            </a:extLst>
-          </a:blip>
-          <a:stretch>
-            <a:fillRect/>
-          </a:stretch>
-        </p:blipFill>
-        <p:spPr>
-          <a:xfrm>
-            <a:off x="34601" y="4908454"/>
-            <a:ext cx="370850" cy="370850"/>
-          </a:xfrm>
-          <a:prstGeom prst="rect">
-            <a:avLst/>
-          </a:prstGeom>
-        </p:spPr>
-      </p:pic>
-      <p:pic>
-        <p:nvPicPr>
-          <p:cNvPr id="14" name="Imagem 13">
-            <a:extLst>
-              <a:ext uri="{FF2B5EF4-FFF2-40B4-BE49-F238E27FC236}">
-                <a16:creationId xmlns:a16="http://schemas.microsoft.com/office/drawing/2014/main" id="{DCB32E2A-317C-43E0-AD6F-96E284A9C307}"/>
-              </a:ext>
-            </a:extLst>
-          </p:cNvPr>
-          <p:cNvPicPr>
-            <a:picLocks noChangeAspect="1"/>
-          </p:cNvPicPr>
-          <p:nvPr/>
-        </p:nvPicPr>
-        <p:blipFill>
-          <a:blip r:embed="rId5">
-            <a:extLst>
-              <a:ext uri="{28A0092B-C50C-407E-A947-70E740481C1C}">
-                <a14:useLocalDpi xmlns:a14="http://schemas.microsoft.com/office/drawing/2010/main" val="0"/>
-              </a:ext>
-            </a:extLst>
-          </a:blip>
-          <a:stretch>
-            <a:fillRect/>
-          </a:stretch>
-        </p:blipFill>
-        <p:spPr>
-          <a:xfrm>
-            <a:off x="6908367" y="3429000"/>
-            <a:ext cx="370850" cy="370850"/>
-          </a:xfrm>
-          <a:prstGeom prst="rect">
-            <a:avLst/>
-          </a:prstGeom>
-        </p:spPr>
-      </p:pic>
-      <p:pic>
-        <p:nvPicPr>
-          <p:cNvPr id="15" name="Imagem 14">
-            <a:extLst>
-              <a:ext uri="{FF2B5EF4-FFF2-40B4-BE49-F238E27FC236}">
-                <a16:creationId xmlns:a16="http://schemas.microsoft.com/office/drawing/2014/main" id="{50559897-409F-40BD-A683-74624E37AB11}"/>
-              </a:ext>
-            </a:extLst>
-          </p:cNvPr>
-          <p:cNvPicPr>
-            <a:picLocks noChangeAspect="1"/>
-          </p:cNvPicPr>
-          <p:nvPr/>
-        </p:nvPicPr>
-        <p:blipFill>
-          <a:blip r:embed="rId5">
-            <a:extLst>
-              <a:ext uri="{28A0092B-C50C-407E-A947-70E740481C1C}">
-                <a14:useLocalDpi xmlns:a14="http://schemas.microsoft.com/office/drawing/2010/main" val="0"/>
-              </a:ext>
-            </a:extLst>
-          </a:blip>
-          <a:stretch>
-            <a:fillRect/>
-          </a:stretch>
-        </p:blipFill>
-        <p:spPr>
-          <a:xfrm>
-            <a:off x="11048187" y="4575327"/>
-            <a:ext cx="370850" cy="370850"/>
-          </a:xfrm>
-          <a:prstGeom prst="rect">
-            <a:avLst/>
-          </a:prstGeom>
-        </p:spPr>
-      </p:pic>
+            <a:endParaRPr lang="pt-BR">
+              <a:solidFill>
+                <a:schemeClr val="tx1"/>
+              </a:solidFill>
+            </a:endParaRPr>
+          </a:p>
+        </p:txBody>
+      </p:sp>
     </p:spTree>
     <p:extLst>
       <p:ext uri="{BB962C8B-B14F-4D97-AF65-F5344CB8AC3E}">
-        <p14:creationId xmlns:p14="http://schemas.microsoft.com/office/powerpoint/2010/main" val="3200323309"/>
+        <p14:creationId xmlns:p14="http://schemas.microsoft.com/office/powerpoint/2010/main" val="4037592579"/>
       </p:ext>
     </p:extLst>
   </p:cSld>
   <p:clrMapOvr>
     <a:masterClrMapping/>
   </p:clrMapOvr>
-  <mc:AlternateContent xmlns:mc="http://schemas.openxmlformats.org/markup-compatibility/2006">
-    <mc:Choice xmlns:p14="http://schemas.microsoft.com/office/powerpoint/2010/main" Requires="p14">
-      <p:transition spd="slow" p14:dur="1200">
-        <p:dissolve/>
-      </p:transition>
-    </mc:Choice>
-    <mc:Fallback>
-      <p:transition spd="slow">
-        <p:dissolve/>
-      </p:transition>
-    </mc:Fallback>
-  </mc:AlternateContent>
+  <p:transition spd="slow">
+    <p:cover/>
+  </p:transition>
 </p:sld>
 </file>
 
@@ -4741,6 +4787,432 @@
       </p:grpSpPr>
       <p:sp>
         <p:nvSpPr>
+          <p:cNvPr id="4" name="Retângulo 3">
+            <a:extLst>
+              <a:ext uri="{FF2B5EF4-FFF2-40B4-BE49-F238E27FC236}">
+                <a16:creationId xmlns:a16="http://schemas.microsoft.com/office/drawing/2014/main" id="{853E865E-546C-4B53-A92E-E1CB442BF142}"/>
+              </a:ext>
+            </a:extLst>
+          </p:cNvPr>
+          <p:cNvSpPr/>
+          <p:nvPr/>
+        </p:nvSpPr>
+        <p:spPr>
+          <a:xfrm>
+            <a:off x="0" y="0"/>
+            <a:ext cx="12192000" cy="6858000"/>
+          </a:xfrm>
+          <a:prstGeom prst="rect">
+            <a:avLst/>
+          </a:prstGeom>
+          <a:solidFill>
+            <a:srgbClr val="3A3A3C"/>
+          </a:solidFill>
+          <a:ln>
+            <a:noFill/>
+          </a:ln>
+        </p:spPr>
+        <p:style>
+          <a:lnRef idx="2">
+            <a:schemeClr val="accent1">
+              <a:shade val="50000"/>
+            </a:schemeClr>
+          </a:lnRef>
+          <a:fillRef idx="1">
+            <a:schemeClr val="accent1"/>
+          </a:fillRef>
+          <a:effectRef idx="0">
+            <a:schemeClr val="accent1"/>
+          </a:effectRef>
+          <a:fontRef idx="minor">
+            <a:schemeClr val="lt1"/>
+          </a:fontRef>
+        </p:style>
+        <p:txBody>
+          <a:bodyPr rtlCol="0" anchor="ctr"/>
+          <a:lstStyle/>
+          <a:p>
+            <a:pPr algn="ctr"/>
+            <a:endParaRPr lang="pt-BR"/>
+          </a:p>
+        </p:txBody>
+      </p:sp>
+      <p:sp>
+        <p:nvSpPr>
+          <p:cNvPr id="6" name="CaixaDeTexto 5">
+            <a:extLst>
+              <a:ext uri="{FF2B5EF4-FFF2-40B4-BE49-F238E27FC236}">
+                <a16:creationId xmlns:a16="http://schemas.microsoft.com/office/drawing/2014/main" id="{E7F00FCA-2339-4457-837D-3F0B366728C3}"/>
+              </a:ext>
+            </a:extLst>
+          </p:cNvPr>
+          <p:cNvSpPr txBox="1"/>
+          <p:nvPr/>
+        </p:nvSpPr>
+        <p:spPr>
+          <a:xfrm>
+            <a:off x="3905165" y="2271213"/>
+            <a:ext cx="4411588" cy="369332"/>
+          </a:xfrm>
+          <a:prstGeom prst="rect">
+            <a:avLst/>
+          </a:prstGeom>
+          <a:noFill/>
+        </p:spPr>
+        <p:txBody>
+          <a:bodyPr wrap="square" rtlCol="0">
+            <a:spAutoFit/>
+          </a:bodyPr>
+          <a:lstStyle/>
+          <a:p>
+            <a:r>
+              <a:rPr lang="pt-BR" dirty="0">
+                <a:solidFill>
+                  <a:schemeClr val="bg1"/>
+                </a:solidFill>
+                <a:latin typeface="Montserrat Alternates ExtraBold" panose="00000900000000000000" pitchFamily="2" charset="0"/>
+              </a:rPr>
+              <a:t>Requisitos para rodar o aplicativo</a:t>
+            </a:r>
+          </a:p>
+        </p:txBody>
+      </p:sp>
+      <p:pic>
+        <p:nvPicPr>
+          <p:cNvPr id="3" name="Imagem 2">
+            <a:extLst>
+              <a:ext uri="{FF2B5EF4-FFF2-40B4-BE49-F238E27FC236}">
+                <a16:creationId xmlns:a16="http://schemas.microsoft.com/office/drawing/2014/main" id="{61CFC1CB-6889-4097-B9F4-6BF5927268F1}"/>
+              </a:ext>
+            </a:extLst>
+          </p:cNvPr>
+          <p:cNvPicPr>
+            <a:picLocks noChangeAspect="1"/>
+          </p:cNvPicPr>
+          <p:nvPr/>
+        </p:nvPicPr>
+        <p:blipFill>
+          <a:blip r:embed="rId2">
+            <a:extLst>
+              <a:ext uri="{28A0092B-C50C-407E-A947-70E740481C1C}">
+                <a14:useLocalDpi xmlns:a14="http://schemas.microsoft.com/office/drawing/2010/main" val="0"/>
+              </a:ext>
+            </a:extLst>
+          </a:blip>
+          <a:stretch>
+            <a:fillRect/>
+          </a:stretch>
+        </p:blipFill>
+        <p:spPr>
+          <a:xfrm>
+            <a:off x="4253768" y="324354"/>
+            <a:ext cx="3684464" cy="1622505"/>
+          </a:xfrm>
+          <a:prstGeom prst="rect">
+            <a:avLst/>
+          </a:prstGeom>
+        </p:spPr>
+      </p:pic>
+      <p:sp>
+        <p:nvSpPr>
+          <p:cNvPr id="8" name="Retângulo 7">
+            <a:extLst>
+              <a:ext uri="{FF2B5EF4-FFF2-40B4-BE49-F238E27FC236}">
+                <a16:creationId xmlns:a16="http://schemas.microsoft.com/office/drawing/2014/main" id="{E28103B2-CB44-4678-B1C2-AE5D46F99800}"/>
+              </a:ext>
+            </a:extLst>
+          </p:cNvPr>
+          <p:cNvSpPr/>
+          <p:nvPr/>
+        </p:nvSpPr>
+        <p:spPr>
+          <a:xfrm>
+            <a:off x="6065240" y="2818701"/>
+            <a:ext cx="45719" cy="3884103"/>
+          </a:xfrm>
+          <a:prstGeom prst="rect">
+            <a:avLst/>
+          </a:prstGeom>
+          <a:solidFill>
+            <a:schemeClr val="bg1"/>
+          </a:solidFill>
+          <a:ln>
+            <a:noFill/>
+          </a:ln>
+        </p:spPr>
+        <p:style>
+          <a:lnRef idx="2">
+            <a:schemeClr val="accent1">
+              <a:shade val="50000"/>
+            </a:schemeClr>
+          </a:lnRef>
+          <a:fillRef idx="1">
+            <a:schemeClr val="accent1"/>
+          </a:fillRef>
+          <a:effectRef idx="0">
+            <a:schemeClr val="accent1"/>
+          </a:effectRef>
+          <a:fontRef idx="minor">
+            <a:schemeClr val="lt1"/>
+          </a:fontRef>
+        </p:style>
+        <p:txBody>
+          <a:bodyPr rtlCol="0" anchor="ctr"/>
+          <a:lstStyle/>
+          <a:p>
+            <a:pPr algn="ctr"/>
+            <a:endParaRPr lang="pt-BR"/>
+          </a:p>
+        </p:txBody>
+      </p:sp>
+      <p:pic>
+        <p:nvPicPr>
+          <p:cNvPr id="9" name="Imagem 8">
+            <a:extLst>
+              <a:ext uri="{FF2B5EF4-FFF2-40B4-BE49-F238E27FC236}">
+                <a16:creationId xmlns:a16="http://schemas.microsoft.com/office/drawing/2014/main" id="{7A60566A-7DDE-4BAE-BF7F-D0CA60A672C4}"/>
+              </a:ext>
+            </a:extLst>
+          </p:cNvPr>
+          <p:cNvPicPr>
+            <a:picLocks noChangeAspect="1"/>
+          </p:cNvPicPr>
+          <p:nvPr/>
+        </p:nvPicPr>
+        <p:blipFill>
+          <a:blip r:embed="rId3"/>
+          <a:stretch>
+            <a:fillRect/>
+          </a:stretch>
+        </p:blipFill>
+        <p:spPr>
+          <a:xfrm>
+            <a:off x="220026" y="3341034"/>
+            <a:ext cx="5353797" cy="1752845"/>
+          </a:xfrm>
+          <a:prstGeom prst="rect">
+            <a:avLst/>
+          </a:prstGeom>
+        </p:spPr>
+      </p:pic>
+      <p:pic>
+        <p:nvPicPr>
+          <p:cNvPr id="10" name="Imagem 9">
+            <a:extLst>
+              <a:ext uri="{FF2B5EF4-FFF2-40B4-BE49-F238E27FC236}">
+                <a16:creationId xmlns:a16="http://schemas.microsoft.com/office/drawing/2014/main" id="{D5FB049D-90F1-463A-B9AB-16B97222B41E}"/>
+              </a:ext>
+            </a:extLst>
+          </p:cNvPr>
+          <p:cNvPicPr>
+            <a:picLocks noChangeAspect="1"/>
+          </p:cNvPicPr>
+          <p:nvPr/>
+        </p:nvPicPr>
+        <p:blipFill>
+          <a:blip r:embed="rId4"/>
+          <a:stretch>
+            <a:fillRect/>
+          </a:stretch>
+        </p:blipFill>
+        <p:spPr>
+          <a:xfrm>
+            <a:off x="7093792" y="3596586"/>
+            <a:ext cx="4115374" cy="1152686"/>
+          </a:xfrm>
+          <a:prstGeom prst="rect">
+            <a:avLst/>
+          </a:prstGeom>
+        </p:spPr>
+      </p:pic>
+      <p:pic>
+        <p:nvPicPr>
+          <p:cNvPr id="12" name="Imagem 11">
+            <a:extLst>
+              <a:ext uri="{FF2B5EF4-FFF2-40B4-BE49-F238E27FC236}">
+                <a16:creationId xmlns:a16="http://schemas.microsoft.com/office/drawing/2014/main" id="{CD017CD3-58CE-4DE2-A6E3-7E3C3C637509}"/>
+              </a:ext>
+            </a:extLst>
+          </p:cNvPr>
+          <p:cNvPicPr>
+            <a:picLocks noChangeAspect="1"/>
+          </p:cNvPicPr>
+          <p:nvPr/>
+        </p:nvPicPr>
+        <p:blipFill>
+          <a:blip r:embed="rId5">
+            <a:extLst>
+              <a:ext uri="{28A0092B-C50C-407E-A947-70E740481C1C}">
+                <a14:useLocalDpi xmlns:a14="http://schemas.microsoft.com/office/drawing/2010/main" val="0"/>
+              </a:ext>
+            </a:extLst>
+          </a:blip>
+          <a:stretch>
+            <a:fillRect/>
+          </a:stretch>
+        </p:blipFill>
+        <p:spPr>
+          <a:xfrm>
+            <a:off x="5388398" y="4908454"/>
+            <a:ext cx="370850" cy="370850"/>
+          </a:xfrm>
+          <a:prstGeom prst="rect">
+            <a:avLst/>
+          </a:prstGeom>
+        </p:spPr>
+      </p:pic>
+      <p:pic>
+        <p:nvPicPr>
+          <p:cNvPr id="13" name="Imagem 12">
+            <a:extLst>
+              <a:ext uri="{FF2B5EF4-FFF2-40B4-BE49-F238E27FC236}">
+                <a16:creationId xmlns:a16="http://schemas.microsoft.com/office/drawing/2014/main" id="{2F6E7C70-48BB-445C-B613-69486461D6F4}"/>
+              </a:ext>
+            </a:extLst>
+          </p:cNvPr>
+          <p:cNvPicPr>
+            <a:picLocks noChangeAspect="1"/>
+          </p:cNvPicPr>
+          <p:nvPr/>
+        </p:nvPicPr>
+        <p:blipFill>
+          <a:blip r:embed="rId5">
+            <a:extLst>
+              <a:ext uri="{28A0092B-C50C-407E-A947-70E740481C1C}">
+                <a14:useLocalDpi xmlns:a14="http://schemas.microsoft.com/office/drawing/2010/main" val="0"/>
+              </a:ext>
+            </a:extLst>
+          </a:blip>
+          <a:stretch>
+            <a:fillRect/>
+          </a:stretch>
+        </p:blipFill>
+        <p:spPr>
+          <a:xfrm>
+            <a:off x="34601" y="4908454"/>
+            <a:ext cx="370850" cy="370850"/>
+          </a:xfrm>
+          <a:prstGeom prst="rect">
+            <a:avLst/>
+          </a:prstGeom>
+        </p:spPr>
+      </p:pic>
+      <p:pic>
+        <p:nvPicPr>
+          <p:cNvPr id="14" name="Imagem 13">
+            <a:extLst>
+              <a:ext uri="{FF2B5EF4-FFF2-40B4-BE49-F238E27FC236}">
+                <a16:creationId xmlns:a16="http://schemas.microsoft.com/office/drawing/2014/main" id="{DCB32E2A-317C-43E0-AD6F-96E284A9C307}"/>
+              </a:ext>
+            </a:extLst>
+          </p:cNvPr>
+          <p:cNvPicPr>
+            <a:picLocks noChangeAspect="1"/>
+          </p:cNvPicPr>
+          <p:nvPr/>
+        </p:nvPicPr>
+        <p:blipFill>
+          <a:blip r:embed="rId5">
+            <a:extLst>
+              <a:ext uri="{28A0092B-C50C-407E-A947-70E740481C1C}">
+                <a14:useLocalDpi xmlns:a14="http://schemas.microsoft.com/office/drawing/2010/main" val="0"/>
+              </a:ext>
+            </a:extLst>
+          </a:blip>
+          <a:stretch>
+            <a:fillRect/>
+          </a:stretch>
+        </p:blipFill>
+        <p:spPr>
+          <a:xfrm>
+            <a:off x="6908367" y="3429000"/>
+            <a:ext cx="370850" cy="370850"/>
+          </a:xfrm>
+          <a:prstGeom prst="rect">
+            <a:avLst/>
+          </a:prstGeom>
+        </p:spPr>
+      </p:pic>
+      <p:pic>
+        <p:nvPicPr>
+          <p:cNvPr id="15" name="Imagem 14">
+            <a:extLst>
+              <a:ext uri="{FF2B5EF4-FFF2-40B4-BE49-F238E27FC236}">
+                <a16:creationId xmlns:a16="http://schemas.microsoft.com/office/drawing/2014/main" id="{50559897-409F-40BD-A683-74624E37AB11}"/>
+              </a:ext>
+            </a:extLst>
+          </p:cNvPr>
+          <p:cNvPicPr>
+            <a:picLocks noChangeAspect="1"/>
+          </p:cNvPicPr>
+          <p:nvPr/>
+        </p:nvPicPr>
+        <p:blipFill>
+          <a:blip r:embed="rId5">
+            <a:extLst>
+              <a:ext uri="{28A0092B-C50C-407E-A947-70E740481C1C}">
+                <a14:useLocalDpi xmlns:a14="http://schemas.microsoft.com/office/drawing/2010/main" val="0"/>
+              </a:ext>
+            </a:extLst>
+          </a:blip>
+          <a:stretch>
+            <a:fillRect/>
+          </a:stretch>
+        </p:blipFill>
+        <p:spPr>
+          <a:xfrm>
+            <a:off x="11048187" y="4575327"/>
+            <a:ext cx="370850" cy="370850"/>
+          </a:xfrm>
+          <a:prstGeom prst="rect">
+            <a:avLst/>
+          </a:prstGeom>
+        </p:spPr>
+      </p:pic>
+    </p:spTree>
+    <p:extLst>
+      <p:ext uri="{BB962C8B-B14F-4D97-AF65-F5344CB8AC3E}">
+        <p14:creationId xmlns:p14="http://schemas.microsoft.com/office/powerpoint/2010/main" val="3200323309"/>
+      </p:ext>
+    </p:extLst>
+  </p:cSld>
+  <p:clrMapOvr>
+    <a:masterClrMapping/>
+  </p:clrMapOvr>
+  <mc:AlternateContent xmlns:mc="http://schemas.openxmlformats.org/markup-compatibility/2006" xmlns:p14="http://schemas.microsoft.com/office/powerpoint/2010/main">
+    <mc:Choice Requires="p14">
+      <p:transition spd="slow" p14:dur="1200">
+        <p:dissolve/>
+      </p:transition>
+    </mc:Choice>
+    <mc:Fallback xmlns="">
+      <p:transition spd="slow">
+        <p:dissolve/>
+      </p:transition>
+    </mc:Fallback>
+  </mc:AlternateContent>
+</p:sld>
+</file>
+
+<file path=ppt/slides/slide6.xml><?xml version="1.0" encoding="utf-8"?>
+<p:sld xmlns:a="http://schemas.openxmlformats.org/drawingml/2006/main" xmlns:r="http://schemas.openxmlformats.org/officeDocument/2006/relationships" xmlns:p="http://schemas.openxmlformats.org/presentationml/2006/main">
+  <p:cSld>
+    <p:spTree>
+      <p:nvGrpSpPr>
+        <p:cNvPr id="1" name=""/>
+        <p:cNvGrpSpPr/>
+        <p:nvPr/>
+      </p:nvGrpSpPr>
+      <p:grpSpPr>
+        <a:xfrm>
+          <a:off x="0" y="0"/>
+          <a:ext cx="0" cy="0"/>
+          <a:chOff x="0" y="0"/>
+          <a:chExt cx="0" cy="0"/>
+        </a:xfrm>
+      </p:grpSpPr>
+      <p:sp>
+        <p:nvSpPr>
           <p:cNvPr id="6" name="CaixaDeTexto 5">
             <a:extLst>
               <a:ext uri="{FF2B5EF4-FFF2-40B4-BE49-F238E27FC236}">
@@ -5313,13 +5785,13 @@
   <p:clrMapOvr>
     <a:masterClrMapping/>
   </p:clrMapOvr>
-  <mc:AlternateContent xmlns:mc="http://schemas.openxmlformats.org/markup-compatibility/2006">
-    <mc:Choice xmlns:p14="http://schemas.microsoft.com/office/powerpoint/2010/main" Requires="p14">
+  <mc:AlternateContent xmlns:mc="http://schemas.openxmlformats.org/markup-compatibility/2006" xmlns:p14="http://schemas.microsoft.com/office/powerpoint/2010/main">
+    <mc:Choice Requires="p14">
       <p:transition spd="slow" p14:dur="1500">
         <p:split orient="vert"/>
       </p:transition>
     </mc:Choice>
-    <mc:Fallback>
+    <mc:Fallback xmlns="">
       <p:transition spd="slow">
         <p:split orient="vert"/>
       </p:transition>

</xml_diff>

<commit_message>
Adicionando detalhes finais na apresentação
Adicionado 1 título a mais na apresentação final
</commit_message>
<xml_diff>
--- a/apresentacao/Guilherme_Samuel_dos_Santos_SP_Apresentacao.pptx
+++ b/apresentacao/Guilherme_Samuel_dos_Santos_SP_Apresentacao.pptx
@@ -4297,13 +4297,13 @@
   <p:clrMapOvr>
     <a:masterClrMapping/>
   </p:clrMapOvr>
-  <mc:AlternateContent xmlns:mc="http://schemas.openxmlformats.org/markup-compatibility/2006">
-    <mc:Choice xmlns:p14="http://schemas.microsoft.com/office/powerpoint/2010/main" Requires="p14">
+  <mc:AlternateContent xmlns:mc="http://schemas.openxmlformats.org/markup-compatibility/2006" xmlns:p14="http://schemas.microsoft.com/office/powerpoint/2010/main">
+    <mc:Choice Requires="p14">
       <p:transition spd="slow" p14:dur="800">
         <p:circle/>
       </p:transition>
     </mc:Choice>
-    <mc:Fallback>
+    <mc:Fallback xmlns="">
       <p:transition spd="slow">
         <p:circle/>
       </p:transition>
@@ -4749,6 +4749,44 @@
                 <a:schemeClr val="tx1"/>
               </a:solidFill>
             </a:endParaRPr>
+          </a:p>
+        </p:txBody>
+      </p:sp>
+      <p:sp>
+        <p:nvSpPr>
+          <p:cNvPr id="11" name="CaixaDeTexto 10">
+            <a:extLst>
+              <a:ext uri="{FF2B5EF4-FFF2-40B4-BE49-F238E27FC236}">
+                <a16:creationId xmlns:a16="http://schemas.microsoft.com/office/drawing/2014/main" id="{550AE972-A668-4A79-8474-D16300B74318}"/>
+              </a:ext>
+            </a:extLst>
+          </p:cNvPr>
+          <p:cNvSpPr txBox="1"/>
+          <p:nvPr/>
+        </p:nvSpPr>
+        <p:spPr>
+          <a:xfrm>
+            <a:off x="2057400" y="449071"/>
+            <a:ext cx="5202644" cy="646331"/>
+          </a:xfrm>
+          <a:prstGeom prst="rect">
+            <a:avLst/>
+          </a:prstGeom>
+          <a:noFill/>
+        </p:spPr>
+        <p:txBody>
+          <a:bodyPr wrap="square" rtlCol="0">
+            <a:spAutoFit/>
+          </a:bodyPr>
+          <a:lstStyle/>
+          <a:p>
+            <a:pPr algn="ctr"/>
+            <a:r>
+              <a:rPr lang="pt-BR" sz="3600" dirty="0">
+                <a:latin typeface="Montserrat Alternates ExtraBold" panose="00000900000000000000" pitchFamily="2" charset="0"/>
+              </a:rPr>
+              <a:t>Como ele funciona?</a:t>
+            </a:r>
           </a:p>
         </p:txBody>
       </p:sp>

</xml_diff>